<commit_message>
final draft question 2
</commit_message>
<xml_diff>
--- a/presentation_05032023.pptx
+++ b/presentation_05032023.pptx
@@ -5,7 +5,7 @@
     <p:sldMasterId id="2147483733" r:id="rId4"/>
   </p:sldMasterIdLst>
   <p:notesMasterIdLst>
-    <p:notesMasterId r:id="rId27"/>
+    <p:notesMasterId r:id="rId29"/>
   </p:notesMasterIdLst>
   <p:sldIdLst>
     <p:sldId id="401" r:id="rId5"/>
@@ -22,14 +22,16 @@
     <p:sldId id="413" r:id="rId16"/>
     <p:sldId id="430" r:id="rId17"/>
     <p:sldId id="414" r:id="rId18"/>
-    <p:sldId id="418" r:id="rId19"/>
-    <p:sldId id="416" r:id="rId20"/>
-    <p:sldId id="420" r:id="rId21"/>
-    <p:sldId id="421" r:id="rId22"/>
-    <p:sldId id="419" r:id="rId23"/>
-    <p:sldId id="408" r:id="rId24"/>
-    <p:sldId id="409" r:id="rId25"/>
-    <p:sldId id="429" r:id="rId26"/>
+    <p:sldId id="432" r:id="rId19"/>
+    <p:sldId id="433" r:id="rId20"/>
+    <p:sldId id="418" r:id="rId21"/>
+    <p:sldId id="416" r:id="rId22"/>
+    <p:sldId id="420" r:id="rId23"/>
+    <p:sldId id="421" r:id="rId24"/>
+    <p:sldId id="435" r:id="rId25"/>
+    <p:sldId id="419" r:id="rId26"/>
+    <p:sldId id="409" r:id="rId27"/>
+    <p:sldId id="429" r:id="rId28"/>
   </p:sldIdLst>
   <p:sldSz cx="12192000" cy="6858000"/>
   <p:notesSz cx="6858000" cy="9144000"/>
@@ -510,6 +512,354 @@
     </a:lvl9pPr>
   </p:notesStyle>
 </p:notesMaster>
+</file>
+
+<file path=ppt/notesSlides/notesSlide1.xml><?xml version="1.0" encoding="utf-8"?>
+<p:notes xmlns:a="http://schemas.openxmlformats.org/drawingml/2006/main" xmlns:r="http://schemas.openxmlformats.org/officeDocument/2006/relationships" xmlns:p="http://schemas.openxmlformats.org/presentationml/2006/main">
+  <p:cSld>
+    <p:spTree>
+      <p:nvGrpSpPr>
+        <p:cNvPr id="1" name=""/>
+        <p:cNvGrpSpPr/>
+        <p:nvPr/>
+      </p:nvGrpSpPr>
+      <p:grpSpPr>
+        <a:xfrm>
+          <a:off x="0" y="0"/>
+          <a:ext cx="0" cy="0"/>
+          <a:chOff x="0" y="0"/>
+          <a:chExt cx="0" cy="0"/>
+        </a:xfrm>
+      </p:grpSpPr>
+      <p:sp>
+        <p:nvSpPr>
+          <p:cNvPr id="2" name="Slide Image Placeholder 1"/>
+          <p:cNvSpPr>
+            <a:spLocks noGrp="1" noRot="1" noChangeAspect="1"/>
+          </p:cNvSpPr>
+          <p:nvPr>
+            <p:ph type="sldImg"/>
+          </p:nvPr>
+        </p:nvSpPr>
+        <p:spPr/>
+      </p:sp>
+      <p:sp>
+        <p:nvSpPr>
+          <p:cNvPr id="3" name="Notes Placeholder 2"/>
+          <p:cNvSpPr>
+            <a:spLocks noGrp="1"/>
+          </p:cNvSpPr>
+          <p:nvPr>
+            <p:ph type="body" idx="1"/>
+          </p:nvPr>
+        </p:nvSpPr>
+        <p:spPr/>
+        <p:txBody>
+          <a:bodyPr/>
+          <a:lstStyle/>
+          <a:p>
+            <a:r>
+              <a:rPr lang="en-US" dirty="0"/>
+              <a:t>Mention the median, and that the distribution is somewhat symmetric </a:t>
+            </a:r>
+          </a:p>
+        </p:txBody>
+      </p:sp>
+      <p:sp>
+        <p:nvSpPr>
+          <p:cNvPr id="4" name="Slide Number Placeholder 3"/>
+          <p:cNvSpPr>
+            <a:spLocks noGrp="1"/>
+          </p:cNvSpPr>
+          <p:nvPr>
+            <p:ph type="sldNum" sz="quarter" idx="5"/>
+          </p:nvPr>
+        </p:nvSpPr>
+        <p:spPr/>
+        <p:txBody>
+          <a:bodyPr/>
+          <a:lstStyle/>
+          <a:p>
+            <a:fld id="{0D0EDF81-139F-488C-872B-4720FBA6BF98}" type="slidenum">
+              <a:rPr lang="en-US" smtClean="0"/>
+              <a:t>6</a:t>
+            </a:fld>
+            <a:endParaRPr lang="en-US" dirty="0"/>
+          </a:p>
+        </p:txBody>
+      </p:sp>
+    </p:spTree>
+    <p:extLst>
+      <p:ext uri="{BB962C8B-B14F-4D97-AF65-F5344CB8AC3E}">
+        <p14:creationId xmlns:p14="http://schemas.microsoft.com/office/powerpoint/2010/main" val="3532457128"/>
+      </p:ext>
+    </p:extLst>
+  </p:cSld>
+  <p:clrMapOvr>
+    <a:masterClrMapping/>
+  </p:clrMapOvr>
+</p:notes>
+</file>
+
+<file path=ppt/notesSlides/notesSlide2.xml><?xml version="1.0" encoding="utf-8"?>
+<p:notes xmlns:a="http://schemas.openxmlformats.org/drawingml/2006/main" xmlns:r="http://schemas.openxmlformats.org/officeDocument/2006/relationships" xmlns:p="http://schemas.openxmlformats.org/presentationml/2006/main">
+  <p:cSld>
+    <p:spTree>
+      <p:nvGrpSpPr>
+        <p:cNvPr id="1" name=""/>
+        <p:cNvGrpSpPr/>
+        <p:nvPr/>
+      </p:nvGrpSpPr>
+      <p:grpSpPr>
+        <a:xfrm>
+          <a:off x="0" y="0"/>
+          <a:ext cx="0" cy="0"/>
+          <a:chOff x="0" y="0"/>
+          <a:chExt cx="0" cy="0"/>
+        </a:xfrm>
+      </p:grpSpPr>
+      <p:sp>
+        <p:nvSpPr>
+          <p:cNvPr id="2" name="Slide Image Placeholder 1"/>
+          <p:cNvSpPr>
+            <a:spLocks noGrp="1" noRot="1" noChangeAspect="1"/>
+          </p:cNvSpPr>
+          <p:nvPr>
+            <p:ph type="sldImg"/>
+          </p:nvPr>
+        </p:nvSpPr>
+        <p:spPr/>
+      </p:sp>
+      <p:sp>
+        <p:nvSpPr>
+          <p:cNvPr id="3" name="Notes Placeholder 2"/>
+          <p:cNvSpPr>
+            <a:spLocks noGrp="1"/>
+          </p:cNvSpPr>
+          <p:nvPr>
+            <p:ph type="body" idx="1"/>
+          </p:nvPr>
+        </p:nvSpPr>
+        <p:spPr/>
+        <p:txBody>
+          <a:bodyPr/>
+          <a:lstStyle/>
+          <a:p>
+            <a:r>
+              <a:rPr lang="en-US" dirty="0"/>
+              <a:t>Update the coefficients to final values and write p-value in scientific notation</a:t>
+            </a:r>
+          </a:p>
+        </p:txBody>
+      </p:sp>
+      <p:sp>
+        <p:nvSpPr>
+          <p:cNvPr id="4" name="Slide Number Placeholder 3"/>
+          <p:cNvSpPr>
+            <a:spLocks noGrp="1"/>
+          </p:cNvSpPr>
+          <p:nvPr>
+            <p:ph type="sldNum" sz="quarter" idx="5"/>
+          </p:nvPr>
+        </p:nvSpPr>
+        <p:spPr/>
+        <p:txBody>
+          <a:bodyPr/>
+          <a:lstStyle/>
+          <a:p>
+            <a:fld id="{0D0EDF81-139F-488C-872B-4720FBA6BF98}" type="slidenum">
+              <a:rPr lang="en-US" smtClean="0"/>
+              <a:t>12</a:t>
+            </a:fld>
+            <a:endParaRPr lang="en-US" dirty="0"/>
+          </a:p>
+        </p:txBody>
+      </p:sp>
+    </p:spTree>
+    <p:extLst>
+      <p:ext uri="{BB962C8B-B14F-4D97-AF65-F5344CB8AC3E}">
+        <p14:creationId xmlns:p14="http://schemas.microsoft.com/office/powerpoint/2010/main" val="1224951496"/>
+      </p:ext>
+    </p:extLst>
+  </p:cSld>
+  <p:clrMapOvr>
+    <a:masterClrMapping/>
+  </p:clrMapOvr>
+</p:notes>
+</file>
+
+<file path=ppt/notesSlides/notesSlide3.xml><?xml version="1.0" encoding="utf-8"?>
+<p:notes xmlns:a="http://schemas.openxmlformats.org/drawingml/2006/main" xmlns:r="http://schemas.openxmlformats.org/officeDocument/2006/relationships" xmlns:p="http://schemas.openxmlformats.org/presentationml/2006/main">
+  <p:cSld>
+    <p:spTree>
+      <p:nvGrpSpPr>
+        <p:cNvPr id="1" name=""/>
+        <p:cNvGrpSpPr/>
+        <p:nvPr/>
+      </p:nvGrpSpPr>
+      <p:grpSpPr>
+        <a:xfrm>
+          <a:off x="0" y="0"/>
+          <a:ext cx="0" cy="0"/>
+          <a:chOff x="0" y="0"/>
+          <a:chExt cx="0" cy="0"/>
+        </a:xfrm>
+      </p:grpSpPr>
+      <p:sp>
+        <p:nvSpPr>
+          <p:cNvPr id="2" name="Slide Image Placeholder 1"/>
+          <p:cNvSpPr>
+            <a:spLocks noGrp="1" noRot="1" noChangeAspect="1"/>
+          </p:cNvSpPr>
+          <p:nvPr>
+            <p:ph type="sldImg"/>
+          </p:nvPr>
+        </p:nvSpPr>
+        <p:spPr/>
+      </p:sp>
+      <p:sp>
+        <p:nvSpPr>
+          <p:cNvPr id="3" name="Notes Placeholder 2"/>
+          <p:cNvSpPr>
+            <a:spLocks noGrp="1"/>
+          </p:cNvSpPr>
+          <p:nvPr>
+            <p:ph type="body" idx="1"/>
+          </p:nvPr>
+        </p:nvSpPr>
+        <p:spPr/>
+        <p:txBody>
+          <a:bodyPr/>
+          <a:lstStyle/>
+          <a:p>
+            <a:r>
+              <a:rPr lang="en-US" dirty="0"/>
+              <a:t>Finish the legend</a:t>
+            </a:r>
+          </a:p>
+        </p:txBody>
+      </p:sp>
+      <p:sp>
+        <p:nvSpPr>
+          <p:cNvPr id="4" name="Slide Number Placeholder 3"/>
+          <p:cNvSpPr>
+            <a:spLocks noGrp="1"/>
+          </p:cNvSpPr>
+          <p:nvPr>
+            <p:ph type="sldNum" sz="quarter" idx="5"/>
+          </p:nvPr>
+        </p:nvSpPr>
+        <p:spPr/>
+        <p:txBody>
+          <a:bodyPr/>
+          <a:lstStyle/>
+          <a:p>
+            <a:fld id="{0D0EDF81-139F-488C-872B-4720FBA6BF98}" type="slidenum">
+              <a:rPr lang="en-US" smtClean="0"/>
+              <a:t>13</a:t>
+            </a:fld>
+            <a:endParaRPr lang="en-US" dirty="0"/>
+          </a:p>
+        </p:txBody>
+      </p:sp>
+    </p:spTree>
+    <p:extLst>
+      <p:ext uri="{BB962C8B-B14F-4D97-AF65-F5344CB8AC3E}">
+        <p14:creationId xmlns:p14="http://schemas.microsoft.com/office/powerpoint/2010/main" val="4146387051"/>
+      </p:ext>
+    </p:extLst>
+  </p:cSld>
+  <p:clrMapOvr>
+    <a:masterClrMapping/>
+  </p:clrMapOvr>
+</p:notes>
+</file>
+
+<file path=ppt/notesSlides/notesSlide4.xml><?xml version="1.0" encoding="utf-8"?>
+<p:notes xmlns:a="http://schemas.openxmlformats.org/drawingml/2006/main" xmlns:r="http://schemas.openxmlformats.org/officeDocument/2006/relationships" xmlns:p="http://schemas.openxmlformats.org/presentationml/2006/main">
+  <p:cSld>
+    <p:spTree>
+      <p:nvGrpSpPr>
+        <p:cNvPr id="1" name=""/>
+        <p:cNvGrpSpPr/>
+        <p:nvPr/>
+      </p:nvGrpSpPr>
+      <p:grpSpPr>
+        <a:xfrm>
+          <a:off x="0" y="0"/>
+          <a:ext cx="0" cy="0"/>
+          <a:chOff x="0" y="0"/>
+          <a:chExt cx="0" cy="0"/>
+        </a:xfrm>
+      </p:grpSpPr>
+      <p:sp>
+        <p:nvSpPr>
+          <p:cNvPr id="2" name="Slide Image Placeholder 1"/>
+          <p:cNvSpPr>
+            <a:spLocks noGrp="1" noRot="1" noChangeAspect="1"/>
+          </p:cNvSpPr>
+          <p:nvPr>
+            <p:ph type="sldImg"/>
+          </p:nvPr>
+        </p:nvSpPr>
+        <p:spPr/>
+      </p:sp>
+      <p:sp>
+        <p:nvSpPr>
+          <p:cNvPr id="3" name="Notes Placeholder 2"/>
+          <p:cNvSpPr>
+            <a:spLocks noGrp="1"/>
+          </p:cNvSpPr>
+          <p:nvPr>
+            <p:ph type="body" idx="1"/>
+          </p:nvPr>
+        </p:nvSpPr>
+        <p:spPr/>
+        <p:txBody>
+          <a:bodyPr/>
+          <a:lstStyle/>
+          <a:p>
+            <a:r>
+              <a:rPr lang="en-US" dirty="0"/>
+              <a:t>Add legend (take from the prediction plot)</a:t>
+            </a:r>
+          </a:p>
+        </p:txBody>
+      </p:sp>
+      <p:sp>
+        <p:nvSpPr>
+          <p:cNvPr id="4" name="Slide Number Placeholder 3"/>
+          <p:cNvSpPr>
+            <a:spLocks noGrp="1"/>
+          </p:cNvSpPr>
+          <p:nvPr>
+            <p:ph type="sldNum" sz="quarter" idx="5"/>
+          </p:nvPr>
+        </p:nvSpPr>
+        <p:spPr/>
+        <p:txBody>
+          <a:bodyPr/>
+          <a:lstStyle/>
+          <a:p>
+            <a:fld id="{0D0EDF81-139F-488C-872B-4720FBA6BF98}" type="slidenum">
+              <a:rPr lang="en-US" smtClean="0"/>
+              <a:t>24</a:t>
+            </a:fld>
+            <a:endParaRPr lang="en-US" dirty="0"/>
+          </a:p>
+        </p:txBody>
+      </p:sp>
+    </p:spTree>
+    <p:extLst>
+      <p:ext uri="{BB962C8B-B14F-4D97-AF65-F5344CB8AC3E}">
+        <p14:creationId xmlns:p14="http://schemas.microsoft.com/office/powerpoint/2010/main" val="517265681"/>
+      </p:ext>
+    </p:extLst>
+  </p:cSld>
+  <p:clrMapOvr>
+    <a:masterClrMapping/>
+  </p:clrMapOvr>
+</p:notes>
 </file>
 
 <file path=ppt/slideLayouts/slideLayout1.xml><?xml version="1.0" encoding="utf-8"?>
@@ -35155,7 +35505,7 @@
           <p:nvPr/>
         </p:nvPicPr>
         <p:blipFill>
-          <a:blip r:embed="rId2"/>
+          <a:blip r:embed="rId3"/>
           <a:stretch>
             <a:fillRect/>
           </a:stretch>
@@ -35401,7 +35751,7 @@
           <a:p>
             <a:r>
               <a:rPr lang="en-US" dirty="0"/>
-              <a:t>Survival Cox Regression Model</a:t>
+              <a:t>Accelerated Failure Time Model</a:t>
             </a:r>
           </a:p>
         </p:txBody>
@@ -35424,18 +35774,50 @@
         </p:nvSpPr>
         <p:spPr/>
         <p:txBody>
-          <a:bodyPr/>
+          <a:bodyPr>
+            <a:normAutofit/>
+          </a:bodyPr>
           <a:lstStyle/>
+          <a:p>
+            <a:pPr marL="0" indent="0">
+              <a:buNone/>
+            </a:pPr>
+            <a:r>
+              <a:rPr lang="en-US" dirty="0"/>
+              <a:t>Pros:</a:t>
+            </a:r>
+          </a:p>
           <a:p>
             <a:r>
               <a:rPr lang="en-US" dirty="0"/>
-              <a:t>Can use “all” the data</a:t>
+              <a:t>Can use “all” the data: 1,039 cases</a:t>
             </a:r>
           </a:p>
           <a:p>
             <a:r>
               <a:rPr lang="en-US" dirty="0"/>
               <a:t>Accounts for right-censored data from the days to last follow-up</a:t>
+            </a:r>
+          </a:p>
+          <a:p>
+            <a:r>
+              <a:rPr lang="en-US" dirty="0"/>
+              <a:t>The fitted values provide us estimates of survival time</a:t>
+            </a:r>
+          </a:p>
+          <a:p>
+            <a:pPr marL="0" indent="0">
+              <a:buNone/>
+            </a:pPr>
+            <a:r>
+              <a:rPr lang="en-US" dirty="0"/>
+              <a:t>Cons:</a:t>
+            </a:r>
+          </a:p>
+          <a:p>
+            <a:r>
+              <a:rPr lang="en-US" dirty="0"/>
+              <a:t>Fully parametric model requires more assumptions than semi-parametric models (e.g. Cox Proportional Hazard Model)</a:t>
             </a:r>
           </a:p>
           <a:p>
@@ -35549,6 +35931,364 @@
 </file>
 
 <file path=ppt/slides/slide15.xml><?xml version="1.0" encoding="utf-8"?>
+<p:sld xmlns:a="http://schemas.openxmlformats.org/drawingml/2006/main" xmlns:r="http://schemas.openxmlformats.org/officeDocument/2006/relationships" xmlns:p="http://schemas.openxmlformats.org/presentationml/2006/main">
+  <p:cSld>
+    <p:spTree>
+      <p:nvGrpSpPr>
+        <p:cNvPr id="1" name=""/>
+        <p:cNvGrpSpPr/>
+        <p:nvPr/>
+      </p:nvGrpSpPr>
+      <p:grpSpPr>
+        <a:xfrm>
+          <a:off x="0" y="0"/>
+          <a:ext cx="0" cy="0"/>
+          <a:chOff x="0" y="0"/>
+          <a:chExt cx="0" cy="0"/>
+        </a:xfrm>
+      </p:grpSpPr>
+      <p:sp>
+        <p:nvSpPr>
+          <p:cNvPr id="2" name="Title 1">
+            <a:extLst>
+              <a:ext uri="{FF2B5EF4-FFF2-40B4-BE49-F238E27FC236}">
+                <a16:creationId xmlns:a16="http://schemas.microsoft.com/office/drawing/2014/main" id="{78E02B70-F156-443F-2352-4D74BA0F8D9E}"/>
+              </a:ext>
+            </a:extLst>
+          </p:cNvPr>
+          <p:cNvSpPr>
+            <a:spLocks noGrp="1"/>
+          </p:cNvSpPr>
+          <p:nvPr>
+            <p:ph type="title"/>
+          </p:nvPr>
+        </p:nvSpPr>
+        <p:spPr/>
+        <p:txBody>
+          <a:bodyPr/>
+          <a:lstStyle/>
+          <a:p>
+            <a:r>
+              <a:rPr lang="en-US" dirty="0"/>
+              <a:t>Probability estimate of the 5-year survival rate</a:t>
+            </a:r>
+          </a:p>
+        </p:txBody>
+      </p:sp>
+      <p:sp>
+        <p:nvSpPr>
+          <p:cNvPr id="4" name="Date Placeholder 3">
+            <a:extLst>
+              <a:ext uri="{FF2B5EF4-FFF2-40B4-BE49-F238E27FC236}">
+                <a16:creationId xmlns:a16="http://schemas.microsoft.com/office/drawing/2014/main" id="{EEFB3776-CB9A-59E7-BA07-E77086BFFC8D}"/>
+              </a:ext>
+            </a:extLst>
+          </p:cNvPr>
+          <p:cNvSpPr>
+            <a:spLocks noGrp="1"/>
+          </p:cNvSpPr>
+          <p:nvPr>
+            <p:ph type="dt" sz="half" idx="10"/>
+          </p:nvPr>
+        </p:nvSpPr>
+        <p:spPr/>
+        <p:txBody>
+          <a:bodyPr/>
+          <a:lstStyle/>
+          <a:p>
+            <a:r>
+              <a:rPr lang="en-US" dirty="0"/>
+              <a:t>05/03/2023</a:t>
+            </a:r>
+          </a:p>
+        </p:txBody>
+      </p:sp>
+      <p:sp>
+        <p:nvSpPr>
+          <p:cNvPr id="5" name="Footer Placeholder 4">
+            <a:extLst>
+              <a:ext uri="{FF2B5EF4-FFF2-40B4-BE49-F238E27FC236}">
+                <a16:creationId xmlns:a16="http://schemas.microsoft.com/office/drawing/2014/main" id="{9FCCBEEE-5580-D238-5D4C-A8170D5553D0}"/>
+              </a:ext>
+            </a:extLst>
+          </p:cNvPr>
+          <p:cNvSpPr>
+            <a:spLocks noGrp="1"/>
+          </p:cNvSpPr>
+          <p:nvPr>
+            <p:ph type="ftr" sz="quarter" idx="11"/>
+          </p:nvPr>
+        </p:nvSpPr>
+        <p:spPr/>
+        <p:txBody>
+          <a:bodyPr/>
+          <a:lstStyle/>
+          <a:p>
+            <a:pPr algn="l"/>
+            <a:r>
+              <a:rPr lang="en-US" dirty="0"/>
+              <a:t>Interview Scenario – Isabelle Grenier</a:t>
+            </a:r>
+          </a:p>
+        </p:txBody>
+      </p:sp>
+      <p:sp>
+        <p:nvSpPr>
+          <p:cNvPr id="6" name="Slide Number Placeholder 5">
+            <a:extLst>
+              <a:ext uri="{FF2B5EF4-FFF2-40B4-BE49-F238E27FC236}">
+                <a16:creationId xmlns:a16="http://schemas.microsoft.com/office/drawing/2014/main" id="{E7A59D23-4136-6416-5D9F-57FBA871AEEC}"/>
+              </a:ext>
+            </a:extLst>
+          </p:cNvPr>
+          <p:cNvSpPr>
+            <a:spLocks noGrp="1"/>
+          </p:cNvSpPr>
+          <p:nvPr>
+            <p:ph type="sldNum" sz="quarter" idx="12"/>
+          </p:nvPr>
+        </p:nvSpPr>
+        <p:spPr/>
+        <p:txBody>
+          <a:bodyPr/>
+          <a:lstStyle/>
+          <a:p>
+            <a:fld id="{B9713C8C-8E70-45D5-AE59-23E60168254E}" type="slidenum">
+              <a:rPr lang="en-US" smtClean="0"/>
+              <a:t>15</a:t>
+            </a:fld>
+            <a:endParaRPr lang="en-US" dirty="0"/>
+          </a:p>
+        </p:txBody>
+      </p:sp>
+      <p:pic>
+        <p:nvPicPr>
+          <p:cNvPr id="12" name="Picture 11" descr="Chart&#10;&#10;Description automatically generated">
+            <a:extLst>
+              <a:ext uri="{FF2B5EF4-FFF2-40B4-BE49-F238E27FC236}">
+                <a16:creationId xmlns:a16="http://schemas.microsoft.com/office/drawing/2014/main" id="{7321EA84-9D23-4993-9184-41FB8AEA3C6A}"/>
+              </a:ext>
+            </a:extLst>
+          </p:cNvPr>
+          <p:cNvPicPr>
+            <a:picLocks noChangeAspect="1"/>
+          </p:cNvPicPr>
+          <p:nvPr/>
+        </p:nvPicPr>
+        <p:blipFill>
+          <a:blip r:embed="rId2"/>
+          <a:stretch>
+            <a:fillRect/>
+          </a:stretch>
+        </p:blipFill>
+        <p:spPr>
+          <a:xfrm>
+            <a:off x="473402" y="2417321"/>
+            <a:ext cx="10972822" cy="2743206"/>
+          </a:xfrm>
+          <a:prstGeom prst="rect">
+            <a:avLst/>
+          </a:prstGeom>
+        </p:spPr>
+      </p:pic>
+    </p:spTree>
+    <p:extLst>
+      <p:ext uri="{BB962C8B-B14F-4D97-AF65-F5344CB8AC3E}">
+        <p14:creationId xmlns:p14="http://schemas.microsoft.com/office/powerpoint/2010/main" val="3503556951"/>
+      </p:ext>
+    </p:extLst>
+  </p:cSld>
+  <p:clrMapOvr>
+    <a:masterClrMapping/>
+  </p:clrMapOvr>
+</p:sld>
+</file>
+
+<file path=ppt/slides/slide16.xml><?xml version="1.0" encoding="utf-8"?>
+<p:sld xmlns:a="http://schemas.openxmlformats.org/drawingml/2006/main" xmlns:r="http://schemas.openxmlformats.org/officeDocument/2006/relationships" xmlns:p="http://schemas.openxmlformats.org/presentationml/2006/main">
+  <p:cSld>
+    <p:spTree>
+      <p:nvGrpSpPr>
+        <p:cNvPr id="1" name=""/>
+        <p:cNvGrpSpPr/>
+        <p:nvPr/>
+      </p:nvGrpSpPr>
+      <p:grpSpPr>
+        <a:xfrm>
+          <a:off x="0" y="0"/>
+          <a:ext cx="0" cy="0"/>
+          <a:chOff x="0" y="0"/>
+          <a:chExt cx="0" cy="0"/>
+        </a:xfrm>
+      </p:grpSpPr>
+      <p:sp>
+        <p:nvSpPr>
+          <p:cNvPr id="2" name="Title 1">
+            <a:extLst>
+              <a:ext uri="{FF2B5EF4-FFF2-40B4-BE49-F238E27FC236}">
+                <a16:creationId xmlns:a16="http://schemas.microsoft.com/office/drawing/2014/main" id="{78E02B70-F156-443F-2352-4D74BA0F8D9E}"/>
+              </a:ext>
+            </a:extLst>
+          </p:cNvPr>
+          <p:cNvSpPr>
+            <a:spLocks noGrp="1"/>
+          </p:cNvSpPr>
+          <p:nvPr>
+            <p:ph type="title"/>
+          </p:nvPr>
+        </p:nvSpPr>
+        <p:spPr/>
+        <p:txBody>
+          <a:bodyPr/>
+          <a:lstStyle/>
+          <a:p>
+            <a:r>
+              <a:rPr lang="en-US" dirty="0"/>
+              <a:t>Model Limitations</a:t>
+            </a:r>
+          </a:p>
+        </p:txBody>
+      </p:sp>
+      <p:sp>
+        <p:nvSpPr>
+          <p:cNvPr id="3" name="Content Placeholder 2">
+            <a:extLst>
+              <a:ext uri="{FF2B5EF4-FFF2-40B4-BE49-F238E27FC236}">
+                <a16:creationId xmlns:a16="http://schemas.microsoft.com/office/drawing/2014/main" id="{8A9B8F3A-0249-5CD2-65E0-CF019957C8FE}"/>
+              </a:ext>
+            </a:extLst>
+          </p:cNvPr>
+          <p:cNvSpPr>
+            <a:spLocks noGrp="1"/>
+          </p:cNvSpPr>
+          <p:nvPr>
+            <p:ph idx="1"/>
+          </p:nvPr>
+        </p:nvSpPr>
+        <p:spPr/>
+        <p:txBody>
+          <a:bodyPr/>
+          <a:lstStyle/>
+          <a:p>
+            <a:r>
+              <a:rPr lang="en-US" dirty="0"/>
+              <a:t>Extrapolation outside the covariate range</a:t>
+            </a:r>
+          </a:p>
+          <a:p>
+            <a:r>
+              <a:rPr lang="en-US" dirty="0"/>
+              <a:t>Accelerated Failure Time models are parametric which involve additional assumptions</a:t>
+            </a:r>
+          </a:p>
+          <a:p>
+            <a:endParaRPr lang="en-US" dirty="0"/>
+          </a:p>
+          <a:p>
+            <a:endParaRPr lang="en-US" dirty="0"/>
+          </a:p>
+        </p:txBody>
+      </p:sp>
+      <p:sp>
+        <p:nvSpPr>
+          <p:cNvPr id="4" name="Date Placeholder 3">
+            <a:extLst>
+              <a:ext uri="{FF2B5EF4-FFF2-40B4-BE49-F238E27FC236}">
+                <a16:creationId xmlns:a16="http://schemas.microsoft.com/office/drawing/2014/main" id="{EEFB3776-CB9A-59E7-BA07-E77086BFFC8D}"/>
+              </a:ext>
+            </a:extLst>
+          </p:cNvPr>
+          <p:cNvSpPr>
+            <a:spLocks noGrp="1"/>
+          </p:cNvSpPr>
+          <p:nvPr>
+            <p:ph type="dt" sz="half" idx="10"/>
+          </p:nvPr>
+        </p:nvSpPr>
+        <p:spPr/>
+        <p:txBody>
+          <a:bodyPr/>
+          <a:lstStyle/>
+          <a:p>
+            <a:r>
+              <a:rPr lang="en-US" dirty="0"/>
+              <a:t>05/03/2023</a:t>
+            </a:r>
+          </a:p>
+        </p:txBody>
+      </p:sp>
+      <p:sp>
+        <p:nvSpPr>
+          <p:cNvPr id="5" name="Footer Placeholder 4">
+            <a:extLst>
+              <a:ext uri="{FF2B5EF4-FFF2-40B4-BE49-F238E27FC236}">
+                <a16:creationId xmlns:a16="http://schemas.microsoft.com/office/drawing/2014/main" id="{9FCCBEEE-5580-D238-5D4C-A8170D5553D0}"/>
+              </a:ext>
+            </a:extLst>
+          </p:cNvPr>
+          <p:cNvSpPr>
+            <a:spLocks noGrp="1"/>
+          </p:cNvSpPr>
+          <p:nvPr>
+            <p:ph type="ftr" sz="quarter" idx="11"/>
+          </p:nvPr>
+        </p:nvSpPr>
+        <p:spPr/>
+        <p:txBody>
+          <a:bodyPr/>
+          <a:lstStyle/>
+          <a:p>
+            <a:pPr algn="l"/>
+            <a:r>
+              <a:rPr lang="en-US" dirty="0"/>
+              <a:t>Interview Scenario – Isabelle Grenier</a:t>
+            </a:r>
+          </a:p>
+        </p:txBody>
+      </p:sp>
+      <p:sp>
+        <p:nvSpPr>
+          <p:cNvPr id="6" name="Slide Number Placeholder 5">
+            <a:extLst>
+              <a:ext uri="{FF2B5EF4-FFF2-40B4-BE49-F238E27FC236}">
+                <a16:creationId xmlns:a16="http://schemas.microsoft.com/office/drawing/2014/main" id="{E7A59D23-4136-6416-5D9F-57FBA871AEEC}"/>
+              </a:ext>
+            </a:extLst>
+          </p:cNvPr>
+          <p:cNvSpPr>
+            <a:spLocks noGrp="1"/>
+          </p:cNvSpPr>
+          <p:nvPr>
+            <p:ph type="sldNum" sz="quarter" idx="12"/>
+          </p:nvPr>
+        </p:nvSpPr>
+        <p:spPr/>
+        <p:txBody>
+          <a:bodyPr/>
+          <a:lstStyle/>
+          <a:p>
+            <a:fld id="{B9713C8C-8E70-45D5-AE59-23E60168254E}" type="slidenum">
+              <a:rPr lang="en-US" smtClean="0"/>
+              <a:t>16</a:t>
+            </a:fld>
+            <a:endParaRPr lang="en-US" dirty="0"/>
+          </a:p>
+        </p:txBody>
+      </p:sp>
+    </p:spTree>
+    <p:extLst>
+      <p:ext uri="{BB962C8B-B14F-4D97-AF65-F5344CB8AC3E}">
+        <p14:creationId xmlns:p14="http://schemas.microsoft.com/office/powerpoint/2010/main" val="1646576665"/>
+      </p:ext>
+    </p:extLst>
+  </p:cSld>
+  <p:clrMapOvr>
+    <a:masterClrMapping/>
+  </p:clrMapOvr>
+</p:sld>
+</file>
+
+<file path=ppt/slides/slide17.xml><?xml version="1.0" encoding="utf-8"?>
 <p:sld xmlns:a="http://schemas.openxmlformats.org/drawingml/2006/main" xmlns:r="http://schemas.openxmlformats.org/officeDocument/2006/relationships" xmlns:p="http://schemas.openxmlformats.org/presentationml/2006/main">
   <p:cSld>
     <p:spTree>
@@ -35788,7 +36528,7 @@
                   <a:spcPts val="600"/>
                 </a:spcAft>
               </a:pPr>
-              <a:t>15</a:t>
+              <a:t>17</a:t>
             </a:fld>
             <a:endParaRPr lang="en-US"/>
           </a:p>
@@ -35807,7 +36547,7 @@
 </p:sld>
 </file>
 
-<file path=ppt/slides/slide16.xml><?xml version="1.0" encoding="utf-8"?>
+<file path=ppt/slides/slide18.xml><?xml version="1.0" encoding="utf-8"?>
 <p:sld xmlns:a="http://schemas.openxmlformats.org/drawingml/2006/main" xmlns:r="http://schemas.openxmlformats.org/officeDocument/2006/relationships" xmlns:p="http://schemas.openxmlformats.org/presentationml/2006/main">
   <p:cSld>
     <p:spTree>
@@ -35974,7 +36714,7 @@
           <a:p>
             <a:fld id="{B9713C8C-8E70-45D5-AE59-23E60168254E}" type="slidenum">
               <a:rPr lang="en-US" smtClean="0"/>
-              <a:t>16</a:t>
+              <a:t>18</a:t>
             </a:fld>
             <a:endParaRPr lang="en-US" dirty="0"/>
           </a:p>
@@ -35993,7 +36733,7 @@
 </p:sld>
 </file>
 
-<file path=ppt/slides/slide17.xml><?xml version="1.0" encoding="utf-8"?>
+<file path=ppt/slides/slide19.xml><?xml version="1.0" encoding="utf-8"?>
 <p:sld xmlns:a="http://schemas.openxmlformats.org/drawingml/2006/main" xmlns:r="http://schemas.openxmlformats.org/officeDocument/2006/relationships" xmlns:p="http://schemas.openxmlformats.org/presentationml/2006/main">
   <p:cSld>
     <p:spTree>
@@ -36061,7 +36801,27 @@
           <a:p>
             <a:r>
               <a:rPr lang="en-US" dirty="0"/>
-              <a:t>Data clean-up</a:t>
+              <a:t>Clinical Data</a:t>
+            </a:r>
+          </a:p>
+          <a:p>
+            <a:pPr lvl="1"/>
+            <a:r>
+              <a:rPr lang="en-US" dirty="0"/>
+              <a:t>Filter on the cases with known status at the 5-year mark</a:t>
+            </a:r>
+          </a:p>
+          <a:p>
+            <a:pPr lvl="1"/>
+            <a:r>
+              <a:rPr lang="en-US" dirty="0"/>
+              <a:t>Status is defined as the 5-year survival rate</a:t>
+            </a:r>
+          </a:p>
+          <a:p>
+            <a:r>
+              <a:rPr lang="en-US" dirty="0"/>
+              <a:t>Gene Data</a:t>
             </a:r>
           </a:p>
           <a:p>
@@ -36075,7 +36835,22 @@
             <a:pPr lvl="1"/>
             <a:r>
               <a:rPr lang="en-US" dirty="0"/>
-              <a:t>316 cases left after clean-up</a:t>
+              <a:t>Some </a:t>
+            </a:r>
+            <a:r>
+              <a:rPr lang="en-US" i="1" dirty="0"/>
+              <a:t>Case IDs</a:t>
+            </a:r>
+            <a:r>
+              <a:rPr lang="en-US" dirty="0"/>
+              <a:t> had multiple gene expression, we took the first instance</a:t>
+            </a:r>
+          </a:p>
+          <a:p>
+            <a:pPr lvl="1"/>
+            <a:r>
+              <a:rPr lang="en-US" dirty="0"/>
+              <a:t>316 cases left after clean up</a:t>
             </a:r>
           </a:p>
           <a:p>
@@ -36163,7 +36938,7 @@
           <a:p>
             <a:fld id="{B9713C8C-8E70-45D5-AE59-23E60168254E}" type="slidenum">
               <a:rPr lang="en-US" smtClean="0"/>
-              <a:t>17</a:t>
+              <a:t>19</a:t>
             </a:fld>
             <a:endParaRPr lang="en-US" dirty="0"/>
           </a:p>
@@ -36182,7 +36957,196 @@
 </p:sld>
 </file>
 
-<file path=ppt/slides/slide18.xml><?xml version="1.0" encoding="utf-8"?>
+<file path=ppt/slides/slide2.xml><?xml version="1.0" encoding="utf-8"?>
+<p:sld xmlns:a="http://schemas.openxmlformats.org/drawingml/2006/main" xmlns:r="http://schemas.openxmlformats.org/officeDocument/2006/relationships" xmlns:p="http://schemas.openxmlformats.org/presentationml/2006/main">
+  <p:cSld>
+    <p:spTree>
+      <p:nvGrpSpPr>
+        <p:cNvPr id="1" name=""/>
+        <p:cNvGrpSpPr/>
+        <p:nvPr/>
+      </p:nvGrpSpPr>
+      <p:grpSpPr>
+        <a:xfrm>
+          <a:off x="0" y="0"/>
+          <a:ext cx="0" cy="0"/>
+          <a:chOff x="0" y="0"/>
+          <a:chExt cx="0" cy="0"/>
+        </a:xfrm>
+      </p:grpSpPr>
+      <p:sp>
+        <p:nvSpPr>
+          <p:cNvPr id="4" name="Title 3">
+            <a:extLst>
+              <a:ext uri="{FF2B5EF4-FFF2-40B4-BE49-F238E27FC236}">
+                <a16:creationId xmlns:a16="http://schemas.microsoft.com/office/drawing/2014/main" id="{65A85D8F-96DF-414F-96F0-8F01B9758670}"/>
+              </a:ext>
+            </a:extLst>
+          </p:cNvPr>
+          <p:cNvSpPr>
+            <a:spLocks noGrp="1"/>
+          </p:cNvSpPr>
+          <p:nvPr>
+            <p:ph type="title"/>
+          </p:nvPr>
+        </p:nvSpPr>
+        <p:spPr/>
+        <p:txBody>
+          <a:bodyPr/>
+          <a:lstStyle/>
+          <a:p>
+            <a:r>
+              <a:rPr lang="en-US" dirty="0"/>
+              <a:t>Agenda</a:t>
+            </a:r>
+          </a:p>
+        </p:txBody>
+      </p:sp>
+      <p:sp>
+        <p:nvSpPr>
+          <p:cNvPr id="5" name="Content Placeholder 4">
+            <a:extLst>
+              <a:ext uri="{FF2B5EF4-FFF2-40B4-BE49-F238E27FC236}">
+                <a16:creationId xmlns:a16="http://schemas.microsoft.com/office/drawing/2014/main" id="{07F79409-2936-4FDC-BF6F-45FC9FDA836A}"/>
+              </a:ext>
+            </a:extLst>
+          </p:cNvPr>
+          <p:cNvSpPr>
+            <a:spLocks noGrp="1"/>
+          </p:cNvSpPr>
+          <p:nvPr>
+            <p:ph idx="1"/>
+          </p:nvPr>
+        </p:nvSpPr>
+        <p:spPr>
+          <a:xfrm>
+            <a:off x="838200" y="2162895"/>
+            <a:ext cx="10263909" cy="3529014"/>
+          </a:xfrm>
+        </p:spPr>
+        <p:txBody>
+          <a:bodyPr/>
+          <a:lstStyle/>
+          <a:p>
+            <a:r>
+              <a:rPr lang="en-US" dirty="0"/>
+              <a:t>Understanding any relation between 5-year survival and available covariates</a:t>
+            </a:r>
+          </a:p>
+          <a:p>
+            <a:pPr marL="342900" indent="-342900">
+              <a:buFont typeface="Arial" panose="020B0604020202020204" pitchFamily="34" charset="0"/>
+              <a:buChar char="•"/>
+            </a:pPr>
+            <a:r>
+              <a:rPr lang="en-US" dirty="0"/>
+              <a:t>Data overview</a:t>
+            </a:r>
+          </a:p>
+          <a:p>
+            <a:pPr marL="342900" indent="-342900">
+              <a:buFont typeface="Arial" panose="020B0604020202020204" pitchFamily="34" charset="0"/>
+              <a:buChar char="•"/>
+            </a:pPr>
+            <a:r>
+              <a:rPr lang="en-US" dirty="0"/>
+              <a:t>5-year survival logistic regression model</a:t>
+            </a:r>
+          </a:p>
+          <a:p>
+            <a:pPr marL="342900" indent="-342900">
+              <a:buFont typeface="Arial" panose="020B0604020202020204" pitchFamily="34" charset="0"/>
+              <a:buChar char="•"/>
+            </a:pPr>
+            <a:r>
+              <a:rPr lang="en-US" dirty="0"/>
+              <a:t>Accelerated failure time model (Weibull regression model)</a:t>
+            </a:r>
+          </a:p>
+          <a:p>
+            <a:r>
+              <a:rPr lang="en-US" dirty="0"/>
+              <a:t>Understanding the association between genes and patient survival </a:t>
+            </a:r>
+          </a:p>
+          <a:p>
+            <a:pPr marL="342900" indent="-342900">
+              <a:buFont typeface="Arial" panose="020B0604020202020204" pitchFamily="34" charset="0"/>
+              <a:buChar char="•"/>
+            </a:pPr>
+            <a:r>
+              <a:rPr lang="en-US" dirty="0"/>
+              <a:t>Data overview</a:t>
+            </a:r>
+          </a:p>
+          <a:p>
+            <a:pPr marL="342900" indent="-342900">
+              <a:buFont typeface="Arial" panose="020B0604020202020204" pitchFamily="34" charset="0"/>
+              <a:buChar char="•"/>
+            </a:pPr>
+            <a:r>
+              <a:rPr lang="en-US" dirty="0"/>
+              <a:t>Correlation exploration</a:t>
+            </a:r>
+          </a:p>
+          <a:p>
+            <a:pPr marL="342900" indent="-342900">
+              <a:buFont typeface="Arial" panose="020B0604020202020204" pitchFamily="34" charset="0"/>
+              <a:buChar char="•"/>
+            </a:pPr>
+            <a:r>
+              <a:rPr lang="en-US" dirty="0"/>
+              <a:t>Principal component analysis exploration</a:t>
+            </a:r>
+          </a:p>
+          <a:p>
+            <a:endParaRPr lang="en-US" dirty="0"/>
+          </a:p>
+        </p:txBody>
+      </p:sp>
+      <p:sp>
+        <p:nvSpPr>
+          <p:cNvPr id="26" name="Footer Placeholder 25">
+            <a:extLst>
+              <a:ext uri="{FF2B5EF4-FFF2-40B4-BE49-F238E27FC236}">
+                <a16:creationId xmlns:a16="http://schemas.microsoft.com/office/drawing/2014/main" id="{0E469817-940E-4A7E-82D2-9FC9B4D3AA33}"/>
+              </a:ext>
+            </a:extLst>
+          </p:cNvPr>
+          <p:cNvSpPr>
+            <a:spLocks noGrp="1"/>
+          </p:cNvSpPr>
+          <p:nvPr>
+            <p:ph type="ftr" sz="quarter" idx="11"/>
+          </p:nvPr>
+        </p:nvSpPr>
+        <p:spPr/>
+        <p:txBody>
+          <a:bodyPr/>
+          <a:lstStyle/>
+          <a:p>
+            <a:pPr algn="l"/>
+            <a:r>
+              <a:rPr lang="en-US" dirty="0"/>
+              <a:t>Interview Scenario – Isabelle Grenier</a:t>
+            </a:r>
+          </a:p>
+        </p:txBody>
+      </p:sp>
+    </p:spTree>
+    <p:extLst>
+      <p:ext uri="{BB962C8B-B14F-4D97-AF65-F5344CB8AC3E}">
+        <p14:creationId xmlns:p14="http://schemas.microsoft.com/office/powerpoint/2010/main" val="1912948986"/>
+      </p:ext>
+    </p:extLst>
+  </p:cSld>
+  <p:clrMapOvr>
+    <a:masterClrMapping/>
+  </p:clrMapOvr>
+</p:sld>
+</file>
+
+<file path=ppt/slides/slide20.xml><?xml version="1.0" encoding="utf-8"?>
 <p:sld xmlns:a="http://schemas.openxmlformats.org/drawingml/2006/main" xmlns:r="http://schemas.openxmlformats.org/officeDocument/2006/relationships" xmlns:p="http://schemas.openxmlformats.org/presentationml/2006/main">
   <p:cSld>
     <p:spTree>
@@ -36243,46 +37207,20 @@
             <p:ph sz="half" idx="1"/>
           </p:nvPr>
         </p:nvSpPr>
-        <p:spPr/>
+        <p:spPr>
+          <a:xfrm>
+            <a:off x="838199" y="2011680"/>
+            <a:ext cx="9249383" cy="4160520"/>
+          </a:xfrm>
+        </p:spPr>
         <p:txBody>
           <a:bodyPr/>
           <a:lstStyle/>
           <a:p>
             <a:r>
               <a:rPr lang="en-US" dirty="0"/>
-              <a:t>Genes with positive correlation</a:t>
+              <a:t>We compute the correlation between each available gene and the survival status</a:t>
             </a:r>
-          </a:p>
-          <a:p>
-            <a:r>
-              <a:rPr lang="en-US" dirty="0"/>
-              <a:t>Genes with negative correlation</a:t>
-            </a:r>
-          </a:p>
-        </p:txBody>
-      </p:sp>
-      <p:sp>
-        <p:nvSpPr>
-          <p:cNvPr id="4" name="Content Placeholder 3">
-            <a:extLst>
-              <a:ext uri="{FF2B5EF4-FFF2-40B4-BE49-F238E27FC236}">
-                <a16:creationId xmlns:a16="http://schemas.microsoft.com/office/drawing/2014/main" id="{4BA7273F-1228-5381-C2F0-BB027923C78E}"/>
-              </a:ext>
-            </a:extLst>
-          </p:cNvPr>
-          <p:cNvSpPr>
-            <a:spLocks noGrp="1"/>
-          </p:cNvSpPr>
-          <p:nvPr>
-            <p:ph sz="half" idx="2"/>
-          </p:nvPr>
-        </p:nvSpPr>
-        <p:spPr/>
-        <p:txBody>
-          <a:bodyPr/>
-          <a:lstStyle/>
-          <a:p>
-            <a:endParaRPr lang="en-US"/>
           </a:p>
         </p:txBody>
       </p:sp>
@@ -36366,12 +37304,102 @@
           <a:p>
             <a:fld id="{B9713C8C-8E70-45D5-AE59-23E60168254E}" type="slidenum">
               <a:rPr lang="en-US" smtClean="0"/>
-              <a:t>18</a:t>
+              <a:t>20</a:t>
             </a:fld>
             <a:endParaRPr lang="en-US" dirty="0"/>
           </a:p>
         </p:txBody>
       </p:sp>
+      <p:pic>
+        <p:nvPicPr>
+          <p:cNvPr id="9" name="Picture 8" descr="Chart, box and whisker chart&#10;&#10;Description automatically generated">
+            <a:extLst>
+              <a:ext uri="{FF2B5EF4-FFF2-40B4-BE49-F238E27FC236}">
+                <a16:creationId xmlns:a16="http://schemas.microsoft.com/office/drawing/2014/main" id="{094F2DA3-30A4-4F19-C8AC-94928683E1BF}"/>
+              </a:ext>
+            </a:extLst>
+          </p:cNvPr>
+          <p:cNvPicPr>
+            <a:picLocks noChangeAspect="1"/>
+          </p:cNvPicPr>
+          <p:nvPr/>
+        </p:nvPicPr>
+        <p:blipFill>
+          <a:blip r:embed="rId2"/>
+          <a:stretch>
+            <a:fillRect/>
+          </a:stretch>
+        </p:blipFill>
+        <p:spPr>
+          <a:xfrm>
+            <a:off x="8153400" y="3092650"/>
+            <a:ext cx="3655500" cy="3046250"/>
+          </a:xfrm>
+          <a:prstGeom prst="rect">
+            <a:avLst/>
+          </a:prstGeom>
+        </p:spPr>
+      </p:pic>
+      <p:pic>
+        <p:nvPicPr>
+          <p:cNvPr id="11" name="Picture 10" descr="Chart, box and whisker chart&#10;&#10;Description automatically generated">
+            <a:extLst>
+              <a:ext uri="{FF2B5EF4-FFF2-40B4-BE49-F238E27FC236}">
+                <a16:creationId xmlns:a16="http://schemas.microsoft.com/office/drawing/2014/main" id="{5E0D1C34-B91C-9737-116F-5A1D187B8A4A}"/>
+              </a:ext>
+            </a:extLst>
+          </p:cNvPr>
+          <p:cNvPicPr>
+            <a:picLocks noChangeAspect="1"/>
+          </p:cNvPicPr>
+          <p:nvPr/>
+        </p:nvPicPr>
+        <p:blipFill>
+          <a:blip r:embed="rId3"/>
+          <a:stretch>
+            <a:fillRect/>
+          </a:stretch>
+        </p:blipFill>
+        <p:spPr>
+          <a:xfrm>
+            <a:off x="4362371" y="3092651"/>
+            <a:ext cx="3655500" cy="3046250"/>
+          </a:xfrm>
+          <a:prstGeom prst="rect">
+            <a:avLst/>
+          </a:prstGeom>
+        </p:spPr>
+      </p:pic>
+      <p:pic>
+        <p:nvPicPr>
+          <p:cNvPr id="13" name="Picture 12" descr="Chart, histogram&#10;&#10;Description automatically generated">
+            <a:extLst>
+              <a:ext uri="{FF2B5EF4-FFF2-40B4-BE49-F238E27FC236}">
+                <a16:creationId xmlns:a16="http://schemas.microsoft.com/office/drawing/2014/main" id="{7B482501-4CDE-5581-B806-9BDE37F19D2A}"/>
+              </a:ext>
+            </a:extLst>
+          </p:cNvPr>
+          <p:cNvPicPr>
+            <a:picLocks noChangeAspect="1"/>
+          </p:cNvPicPr>
+          <p:nvPr/>
+        </p:nvPicPr>
+        <p:blipFill>
+          <a:blip r:embed="rId4"/>
+          <a:stretch>
+            <a:fillRect/>
+          </a:stretch>
+        </p:blipFill>
+        <p:spPr>
+          <a:xfrm>
+            <a:off x="445932" y="3092650"/>
+            <a:ext cx="3916440" cy="3263700"/>
+          </a:xfrm>
+          <a:prstGeom prst="rect">
+            <a:avLst/>
+          </a:prstGeom>
+        </p:spPr>
+      </p:pic>
     </p:spTree>
     <p:extLst>
       <p:ext uri="{BB962C8B-B14F-4D97-AF65-F5344CB8AC3E}">
@@ -36385,7 +37413,214 @@
 </p:sld>
 </file>
 
-<file path=ppt/slides/slide19.xml><?xml version="1.0" encoding="utf-8"?>
+<file path=ppt/slides/slide21.xml><?xml version="1.0" encoding="utf-8"?>
+<p:sld xmlns:a="http://schemas.openxmlformats.org/drawingml/2006/main" xmlns:r="http://schemas.openxmlformats.org/officeDocument/2006/relationships" xmlns:p="http://schemas.openxmlformats.org/presentationml/2006/main">
+  <p:cSld>
+    <p:spTree>
+      <p:nvGrpSpPr>
+        <p:cNvPr id="1" name=""/>
+        <p:cNvGrpSpPr/>
+        <p:nvPr/>
+      </p:nvGrpSpPr>
+      <p:grpSpPr>
+        <a:xfrm>
+          <a:off x="0" y="0"/>
+          <a:ext cx="0" cy="0"/>
+          <a:chOff x="0" y="0"/>
+          <a:chExt cx="0" cy="0"/>
+        </a:xfrm>
+      </p:grpSpPr>
+      <p:sp>
+        <p:nvSpPr>
+          <p:cNvPr id="2" name="Title 1">
+            <a:extLst>
+              <a:ext uri="{FF2B5EF4-FFF2-40B4-BE49-F238E27FC236}">
+                <a16:creationId xmlns:a16="http://schemas.microsoft.com/office/drawing/2014/main" id="{DD336899-7FF7-5AF4-4F99-1EF370E91D8C}"/>
+              </a:ext>
+            </a:extLst>
+          </p:cNvPr>
+          <p:cNvSpPr>
+            <a:spLocks noGrp="1"/>
+          </p:cNvSpPr>
+          <p:nvPr>
+            <p:ph type="title"/>
+          </p:nvPr>
+        </p:nvSpPr>
+        <p:spPr/>
+        <p:txBody>
+          <a:bodyPr/>
+          <a:lstStyle/>
+          <a:p>
+            <a:r>
+              <a:rPr lang="en-US" dirty="0"/>
+              <a:t>Principal Component Analysis (PCA)</a:t>
+            </a:r>
+          </a:p>
+        </p:txBody>
+      </p:sp>
+      <p:sp>
+        <p:nvSpPr>
+          <p:cNvPr id="3" name="Content Placeholder 2">
+            <a:extLst>
+              <a:ext uri="{FF2B5EF4-FFF2-40B4-BE49-F238E27FC236}">
+                <a16:creationId xmlns:a16="http://schemas.microsoft.com/office/drawing/2014/main" id="{C4780A21-8FAD-C159-C74D-22A3C628C8CE}"/>
+              </a:ext>
+            </a:extLst>
+          </p:cNvPr>
+          <p:cNvSpPr>
+            <a:spLocks noGrp="1"/>
+          </p:cNvSpPr>
+          <p:nvPr>
+            <p:ph sz="half" idx="1"/>
+          </p:nvPr>
+        </p:nvSpPr>
+        <p:spPr>
+          <a:xfrm>
+            <a:off x="838200" y="2011680"/>
+            <a:ext cx="5144312" cy="4160520"/>
+          </a:xfrm>
+        </p:spPr>
+        <p:txBody>
+          <a:bodyPr/>
+          <a:lstStyle/>
+          <a:p>
+            <a:r>
+              <a:rPr lang="en-US" dirty="0"/>
+              <a:t>Looking at the cumulative proportion of variance from PCA for dimensionality reduction</a:t>
+            </a:r>
+          </a:p>
+        </p:txBody>
+      </p:sp>
+      <p:sp>
+        <p:nvSpPr>
+          <p:cNvPr id="5" name="Date Placeholder 4">
+            <a:extLst>
+              <a:ext uri="{FF2B5EF4-FFF2-40B4-BE49-F238E27FC236}">
+                <a16:creationId xmlns:a16="http://schemas.microsoft.com/office/drawing/2014/main" id="{A00D5602-B32D-6859-449E-AE7213659710}"/>
+              </a:ext>
+            </a:extLst>
+          </p:cNvPr>
+          <p:cNvSpPr>
+            <a:spLocks noGrp="1"/>
+          </p:cNvSpPr>
+          <p:nvPr>
+            <p:ph type="dt" sz="half" idx="10"/>
+          </p:nvPr>
+        </p:nvSpPr>
+        <p:spPr/>
+        <p:txBody>
+          <a:bodyPr/>
+          <a:lstStyle/>
+          <a:p>
+            <a:r>
+              <a:rPr lang="en-US" dirty="0"/>
+              <a:t>05/03/2023</a:t>
+            </a:r>
+          </a:p>
+        </p:txBody>
+      </p:sp>
+      <p:sp>
+        <p:nvSpPr>
+          <p:cNvPr id="6" name="Footer Placeholder 5">
+            <a:extLst>
+              <a:ext uri="{FF2B5EF4-FFF2-40B4-BE49-F238E27FC236}">
+                <a16:creationId xmlns:a16="http://schemas.microsoft.com/office/drawing/2014/main" id="{B6735792-E78F-124A-1481-1A6153176391}"/>
+              </a:ext>
+            </a:extLst>
+          </p:cNvPr>
+          <p:cNvSpPr>
+            <a:spLocks noGrp="1"/>
+          </p:cNvSpPr>
+          <p:nvPr>
+            <p:ph type="ftr" sz="quarter" idx="11"/>
+          </p:nvPr>
+        </p:nvSpPr>
+        <p:spPr/>
+        <p:txBody>
+          <a:bodyPr/>
+          <a:lstStyle/>
+          <a:p>
+            <a:pPr algn="l"/>
+            <a:r>
+              <a:rPr lang="en-US" dirty="0"/>
+              <a:t>Interview Scenario – Isabelle Grenier</a:t>
+            </a:r>
+          </a:p>
+        </p:txBody>
+      </p:sp>
+      <p:sp>
+        <p:nvSpPr>
+          <p:cNvPr id="7" name="Slide Number Placeholder 6">
+            <a:extLst>
+              <a:ext uri="{FF2B5EF4-FFF2-40B4-BE49-F238E27FC236}">
+                <a16:creationId xmlns:a16="http://schemas.microsoft.com/office/drawing/2014/main" id="{3D284645-74A9-4209-1803-3824A561E2CB}"/>
+              </a:ext>
+            </a:extLst>
+          </p:cNvPr>
+          <p:cNvSpPr>
+            <a:spLocks noGrp="1"/>
+          </p:cNvSpPr>
+          <p:nvPr>
+            <p:ph type="sldNum" sz="quarter" idx="12"/>
+          </p:nvPr>
+        </p:nvSpPr>
+        <p:spPr/>
+        <p:txBody>
+          <a:bodyPr/>
+          <a:lstStyle/>
+          <a:p>
+            <a:fld id="{B9713C8C-8E70-45D5-AE59-23E60168254E}" type="slidenum">
+              <a:rPr lang="en-US" smtClean="0"/>
+              <a:t>21</a:t>
+            </a:fld>
+            <a:endParaRPr lang="en-US" dirty="0"/>
+          </a:p>
+        </p:txBody>
+      </p:sp>
+      <p:pic>
+        <p:nvPicPr>
+          <p:cNvPr id="8" name="Picture 7" descr="Chart&#10;&#10;Description automatically generated">
+            <a:extLst>
+              <a:ext uri="{FF2B5EF4-FFF2-40B4-BE49-F238E27FC236}">
+                <a16:creationId xmlns:a16="http://schemas.microsoft.com/office/drawing/2014/main" id="{23BDEDCE-9622-6228-BCE0-090F4535B430}"/>
+              </a:ext>
+            </a:extLst>
+          </p:cNvPr>
+          <p:cNvPicPr>
+            <a:picLocks noChangeAspect="1"/>
+          </p:cNvPicPr>
+          <p:nvPr/>
+        </p:nvPicPr>
+        <p:blipFill>
+          <a:blip r:embed="rId2"/>
+          <a:stretch>
+            <a:fillRect/>
+          </a:stretch>
+        </p:blipFill>
+        <p:spPr>
+          <a:xfrm>
+            <a:off x="6369990" y="1840791"/>
+            <a:ext cx="4983810" cy="4153175"/>
+          </a:xfrm>
+          <a:prstGeom prst="rect">
+            <a:avLst/>
+          </a:prstGeom>
+        </p:spPr>
+      </p:pic>
+    </p:spTree>
+    <p:extLst>
+      <p:ext uri="{BB962C8B-B14F-4D97-AF65-F5344CB8AC3E}">
+        <p14:creationId xmlns:p14="http://schemas.microsoft.com/office/powerpoint/2010/main" val="4187166219"/>
+      </p:ext>
+    </p:extLst>
+  </p:cSld>
+  <p:clrMapOvr>
+    <a:masterClrMapping/>
+  </p:clrMapOvr>
+</p:sld>
+</file>
+
+<file path=ppt/slides/slide22.xml><?xml version="1.0" encoding="utf-8"?>
 <p:sld xmlns:a="http://schemas.openxmlformats.org/drawingml/2006/main" xmlns:r="http://schemas.openxmlformats.org/officeDocument/2006/relationships" xmlns:p="http://schemas.openxmlformats.org/presentationml/2006/main">
   <p:cSld>
     <p:spTree>
@@ -36465,13 +37700,10 @@
           </a:bodyPr>
           <a:lstStyle/>
           <a:p>
-            <a:pPr marL="285750" indent="-285750">
-              <a:buFont typeface="Arial" panose="020B0604020202020204" pitchFamily="34" charset="0"/>
-              <a:buChar char="•"/>
-            </a:pPr>
+            <a:pPr marL="285750" indent="-285750"/>
             <a:r>
               <a:rPr lang="en-US" dirty="0"/>
-              <a:t>Archetypal analysis: instead of grouping by looking for the mean of a cluster, we look at finding the boundaries/extreme</a:t>
+              <a:t>Formally include the information we gained to our survival regression model</a:t>
             </a:r>
           </a:p>
           <a:p>
@@ -36481,7 +37713,7 @@
             </a:pPr>
             <a:r>
               <a:rPr lang="en-US" dirty="0"/>
-              <a:t>Include known information in survival regression model</a:t>
+              <a:t>Archetypal analysis: instead of clustering by the center of mass, we look at grouping through the boundaries/extremes</a:t>
             </a:r>
           </a:p>
         </p:txBody>
@@ -36608,7 +37840,7 @@
                   <a:spcPts val="600"/>
                 </a:spcAft>
               </a:pPr>
-              <a:t>19</a:t>
+              <a:t>22</a:t>
             </a:fld>
             <a:endParaRPr lang="en-US"/>
           </a:p>
@@ -36627,379 +37859,7 @@
 </p:sld>
 </file>
 
-<file path=ppt/slides/slide2.xml><?xml version="1.0" encoding="utf-8"?>
-<p:sld xmlns:a="http://schemas.openxmlformats.org/drawingml/2006/main" xmlns:r="http://schemas.openxmlformats.org/officeDocument/2006/relationships" xmlns:p="http://schemas.openxmlformats.org/presentationml/2006/main">
-  <p:cSld>
-    <p:spTree>
-      <p:nvGrpSpPr>
-        <p:cNvPr id="1" name=""/>
-        <p:cNvGrpSpPr/>
-        <p:nvPr/>
-      </p:nvGrpSpPr>
-      <p:grpSpPr>
-        <a:xfrm>
-          <a:off x="0" y="0"/>
-          <a:ext cx="0" cy="0"/>
-          <a:chOff x="0" y="0"/>
-          <a:chExt cx="0" cy="0"/>
-        </a:xfrm>
-      </p:grpSpPr>
-      <p:sp>
-        <p:nvSpPr>
-          <p:cNvPr id="4" name="Title 3">
-            <a:extLst>
-              <a:ext uri="{FF2B5EF4-FFF2-40B4-BE49-F238E27FC236}">
-                <a16:creationId xmlns:a16="http://schemas.microsoft.com/office/drawing/2014/main" id="{65A85D8F-96DF-414F-96F0-8F01B9758670}"/>
-              </a:ext>
-            </a:extLst>
-          </p:cNvPr>
-          <p:cNvSpPr>
-            <a:spLocks noGrp="1"/>
-          </p:cNvSpPr>
-          <p:nvPr>
-            <p:ph type="title"/>
-          </p:nvPr>
-        </p:nvSpPr>
-        <p:spPr/>
-        <p:txBody>
-          <a:bodyPr/>
-          <a:lstStyle/>
-          <a:p>
-            <a:r>
-              <a:rPr lang="en-US" dirty="0"/>
-              <a:t>Agenda</a:t>
-            </a:r>
-          </a:p>
-        </p:txBody>
-      </p:sp>
-      <p:sp>
-        <p:nvSpPr>
-          <p:cNvPr id="5" name="Content Placeholder 4">
-            <a:extLst>
-              <a:ext uri="{FF2B5EF4-FFF2-40B4-BE49-F238E27FC236}">
-                <a16:creationId xmlns:a16="http://schemas.microsoft.com/office/drawing/2014/main" id="{07F79409-2936-4FDC-BF6F-45FC9FDA836A}"/>
-              </a:ext>
-            </a:extLst>
-          </p:cNvPr>
-          <p:cNvSpPr>
-            <a:spLocks noGrp="1"/>
-          </p:cNvSpPr>
-          <p:nvPr>
-            <p:ph idx="1"/>
-          </p:nvPr>
-        </p:nvSpPr>
-        <p:spPr>
-          <a:xfrm>
-            <a:off x="838200" y="2162895"/>
-            <a:ext cx="10263909" cy="3529014"/>
-          </a:xfrm>
-        </p:spPr>
-        <p:txBody>
-          <a:bodyPr/>
-          <a:lstStyle/>
-          <a:p>
-            <a:r>
-              <a:rPr lang="en-US" dirty="0"/>
-              <a:t>Understanding any relation between 5-year survival and available covariates</a:t>
-            </a:r>
-          </a:p>
-          <a:p>
-            <a:pPr marL="342900" indent="-342900">
-              <a:buFont typeface="Arial" panose="020B0604020202020204" pitchFamily="34" charset="0"/>
-              <a:buChar char="•"/>
-            </a:pPr>
-            <a:r>
-              <a:rPr lang="en-US" dirty="0"/>
-              <a:t>Data overview</a:t>
-            </a:r>
-          </a:p>
-          <a:p>
-            <a:pPr marL="342900" indent="-342900">
-              <a:buFont typeface="Arial" panose="020B0604020202020204" pitchFamily="34" charset="0"/>
-              <a:buChar char="•"/>
-            </a:pPr>
-            <a:r>
-              <a:rPr lang="en-US" dirty="0"/>
-              <a:t>5-year survival logistic regression model</a:t>
-            </a:r>
-          </a:p>
-          <a:p>
-            <a:pPr marL="342900" indent="-342900">
-              <a:buFont typeface="Arial" panose="020B0604020202020204" pitchFamily="34" charset="0"/>
-              <a:buChar char="•"/>
-            </a:pPr>
-            <a:r>
-              <a:rPr lang="en-US" dirty="0"/>
-              <a:t>Survival Cox regression model</a:t>
-            </a:r>
-          </a:p>
-          <a:p>
-            <a:r>
-              <a:rPr lang="en-US" dirty="0"/>
-              <a:t>Understanding the association between genes and patient survival </a:t>
-            </a:r>
-          </a:p>
-          <a:p>
-            <a:pPr marL="342900" indent="-342900">
-              <a:buFont typeface="Arial" panose="020B0604020202020204" pitchFamily="34" charset="0"/>
-              <a:buChar char="•"/>
-            </a:pPr>
-            <a:r>
-              <a:rPr lang="en-US" dirty="0"/>
-              <a:t>Data overview</a:t>
-            </a:r>
-          </a:p>
-          <a:p>
-            <a:pPr marL="342900" indent="-342900">
-              <a:buFont typeface="Arial" panose="020B0604020202020204" pitchFamily="34" charset="0"/>
-              <a:buChar char="•"/>
-            </a:pPr>
-            <a:r>
-              <a:rPr lang="en-US" dirty="0"/>
-              <a:t>Correlation exploration</a:t>
-            </a:r>
-          </a:p>
-          <a:p>
-            <a:pPr marL="342900" indent="-342900">
-              <a:buFont typeface="Arial" panose="020B0604020202020204" pitchFamily="34" charset="0"/>
-              <a:buChar char="•"/>
-            </a:pPr>
-            <a:r>
-              <a:rPr lang="en-US" dirty="0"/>
-              <a:t>Principal component analysis exploration</a:t>
-            </a:r>
-          </a:p>
-          <a:p>
-            <a:endParaRPr lang="en-US" dirty="0"/>
-          </a:p>
-        </p:txBody>
-      </p:sp>
-      <p:sp>
-        <p:nvSpPr>
-          <p:cNvPr id="26" name="Footer Placeholder 25">
-            <a:extLst>
-              <a:ext uri="{FF2B5EF4-FFF2-40B4-BE49-F238E27FC236}">
-                <a16:creationId xmlns:a16="http://schemas.microsoft.com/office/drawing/2014/main" id="{0E469817-940E-4A7E-82D2-9FC9B4D3AA33}"/>
-              </a:ext>
-            </a:extLst>
-          </p:cNvPr>
-          <p:cNvSpPr>
-            <a:spLocks noGrp="1"/>
-          </p:cNvSpPr>
-          <p:nvPr>
-            <p:ph type="ftr" sz="quarter" idx="11"/>
-          </p:nvPr>
-        </p:nvSpPr>
-        <p:spPr/>
-        <p:txBody>
-          <a:bodyPr/>
-          <a:lstStyle/>
-          <a:p>
-            <a:pPr algn="l"/>
-            <a:r>
-              <a:rPr lang="en-US" dirty="0"/>
-              <a:t>Interview Scenario – Isabelle Grenier</a:t>
-            </a:r>
-          </a:p>
-        </p:txBody>
-      </p:sp>
-    </p:spTree>
-    <p:extLst>
-      <p:ext uri="{BB962C8B-B14F-4D97-AF65-F5344CB8AC3E}">
-        <p14:creationId xmlns:p14="http://schemas.microsoft.com/office/powerpoint/2010/main" val="1912948986"/>
-      </p:ext>
-    </p:extLst>
-  </p:cSld>
-  <p:clrMapOvr>
-    <a:masterClrMapping/>
-  </p:clrMapOvr>
-</p:sld>
-</file>
-
-<file path=ppt/slides/slide20.xml><?xml version="1.0" encoding="utf-8"?>
-<p:sld xmlns:a="http://schemas.openxmlformats.org/drawingml/2006/main" xmlns:r="http://schemas.openxmlformats.org/officeDocument/2006/relationships" xmlns:p="http://schemas.openxmlformats.org/presentationml/2006/main">
-  <p:cSld>
-    <p:spTree>
-      <p:nvGrpSpPr>
-        <p:cNvPr id="1" name=""/>
-        <p:cNvGrpSpPr/>
-        <p:nvPr/>
-      </p:nvGrpSpPr>
-      <p:grpSpPr>
-        <a:xfrm>
-          <a:off x="0" y="0"/>
-          <a:ext cx="0" cy="0"/>
-          <a:chOff x="0" y="0"/>
-          <a:chExt cx="0" cy="0"/>
-        </a:xfrm>
-      </p:grpSpPr>
-      <p:sp>
-        <p:nvSpPr>
-          <p:cNvPr id="4" name="Title 3">
-            <a:extLst>
-              <a:ext uri="{FF2B5EF4-FFF2-40B4-BE49-F238E27FC236}">
-                <a16:creationId xmlns:a16="http://schemas.microsoft.com/office/drawing/2014/main" id="{80D2FA59-42D1-4596-BADF-65EE2EECB2F4}"/>
-              </a:ext>
-            </a:extLst>
-          </p:cNvPr>
-          <p:cNvSpPr>
-            <a:spLocks noGrp="1"/>
-          </p:cNvSpPr>
-          <p:nvPr>
-            <p:ph type="title"/>
-          </p:nvPr>
-        </p:nvSpPr>
-        <p:spPr/>
-        <p:txBody>
-          <a:bodyPr/>
-          <a:lstStyle/>
-          <a:p>
-            <a:r>
-              <a:rPr lang="en-US" dirty="0"/>
-              <a:t>Summary</a:t>
-            </a:r>
-          </a:p>
-        </p:txBody>
-      </p:sp>
-      <p:sp>
-        <p:nvSpPr>
-          <p:cNvPr id="5" name="Content Placeholder 4">
-            <a:extLst>
-              <a:ext uri="{FF2B5EF4-FFF2-40B4-BE49-F238E27FC236}">
-                <a16:creationId xmlns:a16="http://schemas.microsoft.com/office/drawing/2014/main" id="{708C1B7C-03BA-4C6C-B759-6DAB6A63B451}"/>
-              </a:ext>
-            </a:extLst>
-          </p:cNvPr>
-          <p:cNvSpPr>
-            <a:spLocks noGrp="1"/>
-          </p:cNvSpPr>
-          <p:nvPr>
-            <p:ph idx="1"/>
-          </p:nvPr>
-        </p:nvSpPr>
-        <p:spPr/>
-        <p:txBody>
-          <a:bodyPr/>
-          <a:lstStyle/>
-          <a:p>
-            <a:pPr marL="0" indent="0">
-              <a:buNone/>
-            </a:pPr>
-            <a:r>
-              <a:rPr lang="en-US" sz="1800" dirty="0"/>
-              <a:t>With PowerPoint, you can create presentations and share your work with others, wherever they are. Type the text you want here to get started. You can also add images, art, and videos on this template. Save to OneDrive and access your presentations from your computer, tablet, or phone. </a:t>
-            </a:r>
-          </a:p>
-        </p:txBody>
-      </p:sp>
-      <p:sp>
-        <p:nvSpPr>
-          <p:cNvPr id="10" name="Footer Placeholder 9">
-            <a:extLst>
-              <a:ext uri="{FF2B5EF4-FFF2-40B4-BE49-F238E27FC236}">
-                <a16:creationId xmlns:a16="http://schemas.microsoft.com/office/drawing/2014/main" id="{8751E420-B483-4040-8E33-A32E82D74E33}"/>
-              </a:ext>
-            </a:extLst>
-          </p:cNvPr>
-          <p:cNvSpPr>
-            <a:spLocks noGrp="1"/>
-          </p:cNvSpPr>
-          <p:nvPr>
-            <p:ph type="ftr" sz="quarter" idx="11"/>
-          </p:nvPr>
-        </p:nvSpPr>
-        <p:spPr/>
-        <p:txBody>
-          <a:bodyPr/>
-          <a:lstStyle/>
-          <a:p>
-            <a:pPr algn="l"/>
-            <a:r>
-              <a:rPr lang="en-US" dirty="0"/>
-              <a:t>Interview Scenario – Isabelle Grenier</a:t>
-            </a:r>
-          </a:p>
-        </p:txBody>
-      </p:sp>
-      <p:sp>
-        <p:nvSpPr>
-          <p:cNvPr id="11" name="Slide Number Placeholder 10">
-            <a:extLst>
-              <a:ext uri="{FF2B5EF4-FFF2-40B4-BE49-F238E27FC236}">
-                <a16:creationId xmlns:a16="http://schemas.microsoft.com/office/drawing/2014/main" id="{A720F25F-904B-4AA2-9CB6-69411308A123}"/>
-              </a:ext>
-            </a:extLst>
-          </p:cNvPr>
-          <p:cNvSpPr>
-            <a:spLocks noGrp="1"/>
-          </p:cNvSpPr>
-          <p:nvPr>
-            <p:ph type="sldNum" sz="quarter" idx="12"/>
-          </p:nvPr>
-        </p:nvSpPr>
-        <p:spPr/>
-        <p:txBody>
-          <a:bodyPr/>
-          <a:lstStyle/>
-          <a:p>
-            <a:fld id="{B9713C8C-8E70-45D5-AE59-23E60168254E}" type="slidenum">
-              <a:rPr lang="en-US" smtClean="0"/>
-              <a:t>20</a:t>
-            </a:fld>
-            <a:endParaRPr lang="en-US" dirty="0"/>
-          </a:p>
-        </p:txBody>
-      </p:sp>
-      <p:sp>
-        <p:nvSpPr>
-          <p:cNvPr id="3" name="Picture Placeholder 2">
-            <a:extLst>
-              <a:ext uri="{FF2B5EF4-FFF2-40B4-BE49-F238E27FC236}">
-                <a16:creationId xmlns:a16="http://schemas.microsoft.com/office/drawing/2014/main" id="{7CAF5C06-5B69-DC8A-982D-97FD16BBC5BF}"/>
-              </a:ext>
-            </a:extLst>
-          </p:cNvPr>
-          <p:cNvSpPr>
-            <a:spLocks noGrp="1"/>
-          </p:cNvSpPr>
-          <p:nvPr>
-            <p:ph type="pic" sz="quarter" idx="13"/>
-          </p:nvPr>
-        </p:nvSpPr>
-        <p:spPr/>
-      </p:sp>
-      <p:sp>
-        <p:nvSpPr>
-          <p:cNvPr id="8" name="Picture Placeholder 7">
-            <a:extLst>
-              <a:ext uri="{FF2B5EF4-FFF2-40B4-BE49-F238E27FC236}">
-                <a16:creationId xmlns:a16="http://schemas.microsoft.com/office/drawing/2014/main" id="{081F53DE-3F3C-1BC9-1823-B620C1CB004C}"/>
-              </a:ext>
-            </a:extLst>
-          </p:cNvPr>
-          <p:cNvSpPr>
-            <a:spLocks noGrp="1"/>
-          </p:cNvSpPr>
-          <p:nvPr>
-            <p:ph type="pic" sz="quarter" idx="14"/>
-          </p:nvPr>
-        </p:nvSpPr>
-        <p:spPr/>
-      </p:sp>
-    </p:spTree>
-    <p:extLst>
-      <p:ext uri="{BB962C8B-B14F-4D97-AF65-F5344CB8AC3E}">
-        <p14:creationId xmlns:p14="http://schemas.microsoft.com/office/powerpoint/2010/main" val="3958427157"/>
-      </p:ext>
-    </p:extLst>
-  </p:cSld>
-  <p:clrMapOvr>
-    <a:masterClrMapping/>
-  </p:clrMapOvr>
-</p:sld>
-</file>
-
-<file path=ppt/slides/slide21.xml><?xml version="1.0" encoding="utf-8"?>
+<file path=ppt/slides/slide23.xml><?xml version="1.0" encoding="utf-8"?>
 <p:sld xmlns:a="http://schemas.openxmlformats.org/drawingml/2006/main" xmlns:r="http://schemas.openxmlformats.org/officeDocument/2006/relationships" xmlns:p="http://schemas.openxmlformats.org/presentationml/2006/main">
   <p:cSld>
     <p:spTree>
@@ -37154,7 +38014,7 @@
 </p:sld>
 </file>
 
-<file path=ppt/slides/slide22.xml><?xml version="1.0" encoding="utf-8"?>
+<file path=ppt/slides/slide24.xml><?xml version="1.0" encoding="utf-8"?>
 <p:sld xmlns:a="http://schemas.openxmlformats.org/drawingml/2006/main" xmlns:r="http://schemas.openxmlformats.org/officeDocument/2006/relationships" xmlns:p="http://schemas.openxmlformats.org/presentationml/2006/main" show="0">
   <p:cSld>
     <p:spTree>
@@ -37345,7 +38205,7 @@
           <a:p>
             <a:fld id="{B9713C8C-8E70-45D5-AE59-23E60168254E}" type="slidenum">
               <a:rPr lang="en-US" smtClean="0"/>
-              <a:t>22</a:t>
+              <a:t>24</a:t>
             </a:fld>
             <a:endParaRPr lang="en-US" dirty="0"/>
           </a:p>
@@ -37366,7 +38226,7 @@
           <p:nvPr/>
         </p:nvPicPr>
         <p:blipFill>
-          <a:blip r:embed="rId2"/>
+          <a:blip r:embed="rId3"/>
           <a:stretch>
             <a:fillRect/>
           </a:stretch>
@@ -37396,7 +38256,7 @@
           <p:nvPr/>
         </p:nvPicPr>
         <p:blipFill>
-          <a:blip r:embed="rId3"/>
+          <a:blip r:embed="rId4"/>
           <a:stretch>
             <a:fillRect/>
           </a:stretch>
@@ -38388,7 +39248,7 @@
           <p:nvPr>
             <p:extLst>
               <p:ext uri="{D42A27DB-BD31-4B8C-83A1-F6EECF244321}">
-                <p14:modId xmlns:p14="http://schemas.microsoft.com/office/powerpoint/2010/main" val="2564467323"/>
+                <p14:modId xmlns:p14="http://schemas.microsoft.com/office/powerpoint/2010/main" val="4279844924"/>
               </p:ext>
             </p:extLst>
           </p:nvPr>
@@ -38619,7 +39479,7 @@
           <p:nvPr/>
         </p:nvPicPr>
         <p:blipFill>
-          <a:blip r:embed="rId2"/>
+          <a:blip r:embed="rId3"/>
           <a:stretch>
             <a:fillRect/>
           </a:stretch>

</xml_diff>

<commit_message>
update figures in part II
</commit_message>
<xml_diff>
--- a/presentation_05032023.pptx
+++ b/presentation_05032023.pptx
@@ -5,7 +5,7 @@
     <p:sldMasterId id="2147483733" r:id="rId4"/>
   </p:sldMasterIdLst>
   <p:notesMasterIdLst>
-    <p:notesMasterId r:id="rId29"/>
+    <p:notesMasterId r:id="rId30"/>
   </p:notesMasterIdLst>
   <p:sldIdLst>
     <p:sldId id="401" r:id="rId5"/>
@@ -28,10 +28,11 @@
     <p:sldId id="416" r:id="rId22"/>
     <p:sldId id="420" r:id="rId23"/>
     <p:sldId id="421" r:id="rId24"/>
-    <p:sldId id="435" r:id="rId25"/>
-    <p:sldId id="419" r:id="rId26"/>
-    <p:sldId id="409" r:id="rId27"/>
-    <p:sldId id="429" r:id="rId28"/>
+    <p:sldId id="436" r:id="rId25"/>
+    <p:sldId id="435" r:id="rId26"/>
+    <p:sldId id="419" r:id="rId27"/>
+    <p:sldId id="409" r:id="rId28"/>
+    <p:sldId id="429" r:id="rId29"/>
   </p:sldIdLst>
   <p:sldSz cx="12192000" cy="6858000"/>
   <p:notesSz cx="6858000" cy="9144000"/>
@@ -247,7 +248,7 @@
           <a:p>
             <a:fld id="{B860B616-BCB2-4E7C-BAA6-B90DF21B9EDF}" type="datetimeFigureOut">
               <a:rPr lang="en-US" smtClean="0"/>
-              <a:t>4/30/2023</a:t>
+              <a:t>5/1/2023</a:t>
             </a:fld>
             <a:endParaRPr lang="en-US" dirty="0"/>
           </a:p>
@@ -843,7 +844,7 @@
           <a:p>
             <a:fld id="{0D0EDF81-139F-488C-872B-4720FBA6BF98}" type="slidenum">
               <a:rPr lang="en-US" smtClean="0"/>
-              <a:t>24</a:t>
+              <a:t>25</a:t>
             </a:fld>
             <a:endParaRPr lang="en-US" dirty="0"/>
           </a:p>
@@ -36808,14 +36809,14 @@
             <a:pPr lvl="1"/>
             <a:r>
               <a:rPr lang="en-US" dirty="0"/>
-              <a:t>Filter on the cases with known status at the 5-year mark</a:t>
+              <a:t>Filter on the cases with a minimum of 3-month history</a:t>
             </a:r>
           </a:p>
           <a:p>
             <a:pPr lvl="1"/>
             <a:r>
               <a:rPr lang="en-US" dirty="0"/>
-              <a:t>Status is defined as the 5-year survival rate</a:t>
+              <a:t>Look at survival time and a subset containing 5-year survival rate information</a:t>
             </a:r>
           </a:p>
           <a:p>
@@ -36828,7 +36829,7 @@
             <a:pPr lvl="1"/>
             <a:r>
               <a:rPr lang="en-US" dirty="0"/>
-              <a:t>Extract gene expression for the cases with known 5-year status</a:t>
+              <a:t>Extract gene expression for the cases with 3-month history</a:t>
             </a:r>
           </a:p>
           <a:p>
@@ -36850,7 +36851,15 @@
             <a:pPr lvl="1"/>
             <a:r>
               <a:rPr lang="en-US" dirty="0"/>
-              <a:t>316 cases left after clean up</a:t>
+              <a:t>A few </a:t>
+            </a:r>
+            <a:r>
+              <a:rPr lang="en-US" i="1" dirty="0"/>
+              <a:t>Case IDs </a:t>
+            </a:r>
+            <a:r>
+              <a:rPr lang="en-US" dirty="0"/>
+              <a:t>were missing the gene expression file</a:t>
             </a:r>
           </a:p>
           <a:p>
@@ -37186,7 +37195,7 @@
           <a:p>
             <a:r>
               <a:rPr lang="en-US" dirty="0"/>
-              <a:t>Correlation Analysis</a:t>
+              <a:t>Correlation Analysis – 5-year Survival Rate</a:t>
             </a:r>
           </a:p>
         </p:txBody>
@@ -37453,7 +37462,7 @@
           <a:p>
             <a:r>
               <a:rPr lang="en-US" dirty="0"/>
-              <a:t>Principal Component Analysis (PCA)</a:t>
+              <a:t>Correlation Analysis – Survival Time</a:t>
             </a:r>
           </a:p>
         </p:txBody>
@@ -37476,8 +37485,8 @@
         </p:nvSpPr>
         <p:spPr>
           <a:xfrm>
-            <a:off x="838200" y="2011680"/>
-            <a:ext cx="5144312" cy="4160520"/>
+            <a:off x="838199" y="2011680"/>
+            <a:ext cx="9249383" cy="4160520"/>
           </a:xfrm>
         </p:spPr>
         <p:txBody>
@@ -37486,7 +37495,7 @@
           <a:p>
             <a:r>
               <a:rPr lang="en-US" dirty="0"/>
-              <a:t>Looking at the cumulative proportion of variance from PCA for dimensionality reduction</a:t>
+              <a:t>We compute the correlation between each available gene and the survival time</a:t>
             </a:r>
           </a:p>
         </p:txBody>
@@ -37579,10 +37588,10 @@
       </p:sp>
       <p:pic>
         <p:nvPicPr>
-          <p:cNvPr id="8" name="Picture 7" descr="Chart&#10;&#10;Description automatically generated">
+          <p:cNvPr id="8" name="Picture 7" descr="Chart, histogram&#10;&#10;Description automatically generated">
             <a:extLst>
               <a:ext uri="{FF2B5EF4-FFF2-40B4-BE49-F238E27FC236}">
-                <a16:creationId xmlns:a16="http://schemas.microsoft.com/office/drawing/2014/main" id="{23BDEDCE-9622-6228-BCE0-090F4535B430}"/>
+                <a16:creationId xmlns:a16="http://schemas.microsoft.com/office/drawing/2014/main" id="{D1B6B052-047D-141F-2C9E-AC090376EB4F}"/>
               </a:ext>
             </a:extLst>
           </p:cNvPr>
@@ -37599,8 +37608,281 @@
         </p:blipFill>
         <p:spPr>
           <a:xfrm>
-            <a:off x="6369990" y="1840791"/>
-            <a:ext cx="4983810" cy="4153175"/>
+            <a:off x="531382" y="3092650"/>
+            <a:ext cx="3695460" cy="3079550"/>
+          </a:xfrm>
+          <a:prstGeom prst="rect">
+            <a:avLst/>
+          </a:prstGeom>
+        </p:spPr>
+      </p:pic>
+      <p:pic>
+        <p:nvPicPr>
+          <p:cNvPr id="12" name="Picture 11" descr="Chart, scatter chart&#10;&#10;Description automatically generated">
+            <a:extLst>
+              <a:ext uri="{FF2B5EF4-FFF2-40B4-BE49-F238E27FC236}">
+                <a16:creationId xmlns:a16="http://schemas.microsoft.com/office/drawing/2014/main" id="{FA331D76-8E3B-C94D-6B70-E0384EA2284C}"/>
+              </a:ext>
+            </a:extLst>
+          </p:cNvPr>
+          <p:cNvPicPr>
+            <a:picLocks noChangeAspect="1"/>
+          </p:cNvPicPr>
+          <p:nvPr/>
+        </p:nvPicPr>
+        <p:blipFill>
+          <a:blip r:embed="rId3"/>
+          <a:stretch>
+            <a:fillRect/>
+          </a:stretch>
+        </p:blipFill>
+        <p:spPr>
+          <a:xfrm>
+            <a:off x="4309828" y="3092650"/>
+            <a:ext cx="3655501" cy="3046251"/>
+          </a:xfrm>
+          <a:prstGeom prst="rect">
+            <a:avLst/>
+          </a:prstGeom>
+        </p:spPr>
+      </p:pic>
+      <p:pic>
+        <p:nvPicPr>
+          <p:cNvPr id="17" name="Picture 16" descr="Chart, scatter chart&#10;&#10;Description automatically generated">
+            <a:extLst>
+              <a:ext uri="{FF2B5EF4-FFF2-40B4-BE49-F238E27FC236}">
+                <a16:creationId xmlns:a16="http://schemas.microsoft.com/office/drawing/2014/main" id="{B537B8BC-C4D0-F0EA-CAED-3D8022CFD83C}"/>
+              </a:ext>
+            </a:extLst>
+          </p:cNvPr>
+          <p:cNvPicPr>
+            <a:picLocks noChangeAspect="1"/>
+          </p:cNvPicPr>
+          <p:nvPr/>
+        </p:nvPicPr>
+        <p:blipFill>
+          <a:blip r:embed="rId4"/>
+          <a:stretch>
+            <a:fillRect/>
+          </a:stretch>
+        </p:blipFill>
+        <p:spPr>
+          <a:xfrm>
+            <a:off x="8048315" y="3092649"/>
+            <a:ext cx="3655501" cy="3046251"/>
+          </a:xfrm>
+          <a:prstGeom prst="rect">
+            <a:avLst/>
+          </a:prstGeom>
+        </p:spPr>
+      </p:pic>
+    </p:spTree>
+    <p:extLst>
+      <p:ext uri="{BB962C8B-B14F-4D97-AF65-F5344CB8AC3E}">
+        <p14:creationId xmlns:p14="http://schemas.microsoft.com/office/powerpoint/2010/main" val="274506420"/>
+      </p:ext>
+    </p:extLst>
+  </p:cSld>
+  <p:clrMapOvr>
+    <a:masterClrMapping/>
+  </p:clrMapOvr>
+</p:sld>
+</file>
+
+<file path=ppt/slides/slide22.xml><?xml version="1.0" encoding="utf-8"?>
+<p:sld xmlns:a="http://schemas.openxmlformats.org/drawingml/2006/main" xmlns:r="http://schemas.openxmlformats.org/officeDocument/2006/relationships" xmlns:p="http://schemas.openxmlformats.org/presentationml/2006/main">
+  <p:cSld>
+    <p:spTree>
+      <p:nvGrpSpPr>
+        <p:cNvPr id="1" name=""/>
+        <p:cNvGrpSpPr/>
+        <p:nvPr/>
+      </p:nvGrpSpPr>
+      <p:grpSpPr>
+        <a:xfrm>
+          <a:off x="0" y="0"/>
+          <a:ext cx="0" cy="0"/>
+          <a:chOff x="0" y="0"/>
+          <a:chExt cx="0" cy="0"/>
+        </a:xfrm>
+      </p:grpSpPr>
+      <p:sp>
+        <p:nvSpPr>
+          <p:cNvPr id="2" name="Title 1">
+            <a:extLst>
+              <a:ext uri="{FF2B5EF4-FFF2-40B4-BE49-F238E27FC236}">
+                <a16:creationId xmlns:a16="http://schemas.microsoft.com/office/drawing/2014/main" id="{DD336899-7FF7-5AF4-4F99-1EF370E91D8C}"/>
+              </a:ext>
+            </a:extLst>
+          </p:cNvPr>
+          <p:cNvSpPr>
+            <a:spLocks noGrp="1"/>
+          </p:cNvSpPr>
+          <p:nvPr>
+            <p:ph type="title"/>
+          </p:nvPr>
+        </p:nvSpPr>
+        <p:spPr/>
+        <p:txBody>
+          <a:bodyPr/>
+          <a:lstStyle/>
+          <a:p>
+            <a:r>
+              <a:rPr lang="en-US" dirty="0"/>
+              <a:t>Principal Component Analysis (PCA)</a:t>
+            </a:r>
+          </a:p>
+        </p:txBody>
+      </p:sp>
+      <p:sp>
+        <p:nvSpPr>
+          <p:cNvPr id="3" name="Content Placeholder 2">
+            <a:extLst>
+              <a:ext uri="{FF2B5EF4-FFF2-40B4-BE49-F238E27FC236}">
+                <a16:creationId xmlns:a16="http://schemas.microsoft.com/office/drawing/2014/main" id="{C4780A21-8FAD-C159-C74D-22A3C628C8CE}"/>
+              </a:ext>
+            </a:extLst>
+          </p:cNvPr>
+          <p:cNvSpPr>
+            <a:spLocks noGrp="1"/>
+          </p:cNvSpPr>
+          <p:nvPr>
+            <p:ph sz="half" idx="1"/>
+          </p:nvPr>
+        </p:nvSpPr>
+        <p:spPr>
+          <a:xfrm>
+            <a:off x="838200" y="2011680"/>
+            <a:ext cx="5144312" cy="4160520"/>
+          </a:xfrm>
+        </p:spPr>
+        <p:txBody>
+          <a:bodyPr/>
+          <a:lstStyle/>
+          <a:p>
+            <a:r>
+              <a:rPr lang="en-US" dirty="0"/>
+              <a:t>Looking at the cumulative proportion of variance from PCA for dimensionality reduction</a:t>
+            </a:r>
+          </a:p>
+          <a:p>
+            <a:r>
+              <a:rPr lang="en-US" dirty="0"/>
+              <a:t>No plateau signifies the absence of a cluster of genes responsible for survival time</a:t>
+            </a:r>
+          </a:p>
+        </p:txBody>
+      </p:sp>
+      <p:sp>
+        <p:nvSpPr>
+          <p:cNvPr id="5" name="Date Placeholder 4">
+            <a:extLst>
+              <a:ext uri="{FF2B5EF4-FFF2-40B4-BE49-F238E27FC236}">
+                <a16:creationId xmlns:a16="http://schemas.microsoft.com/office/drawing/2014/main" id="{A00D5602-B32D-6859-449E-AE7213659710}"/>
+              </a:ext>
+            </a:extLst>
+          </p:cNvPr>
+          <p:cNvSpPr>
+            <a:spLocks noGrp="1"/>
+          </p:cNvSpPr>
+          <p:nvPr>
+            <p:ph type="dt" sz="half" idx="10"/>
+          </p:nvPr>
+        </p:nvSpPr>
+        <p:spPr/>
+        <p:txBody>
+          <a:bodyPr/>
+          <a:lstStyle/>
+          <a:p>
+            <a:r>
+              <a:rPr lang="en-US" dirty="0"/>
+              <a:t>05/03/2023</a:t>
+            </a:r>
+          </a:p>
+        </p:txBody>
+      </p:sp>
+      <p:sp>
+        <p:nvSpPr>
+          <p:cNvPr id="6" name="Footer Placeholder 5">
+            <a:extLst>
+              <a:ext uri="{FF2B5EF4-FFF2-40B4-BE49-F238E27FC236}">
+                <a16:creationId xmlns:a16="http://schemas.microsoft.com/office/drawing/2014/main" id="{B6735792-E78F-124A-1481-1A6153176391}"/>
+              </a:ext>
+            </a:extLst>
+          </p:cNvPr>
+          <p:cNvSpPr>
+            <a:spLocks noGrp="1"/>
+          </p:cNvSpPr>
+          <p:nvPr>
+            <p:ph type="ftr" sz="quarter" idx="11"/>
+          </p:nvPr>
+        </p:nvSpPr>
+        <p:spPr/>
+        <p:txBody>
+          <a:bodyPr/>
+          <a:lstStyle/>
+          <a:p>
+            <a:pPr algn="l"/>
+            <a:r>
+              <a:rPr lang="en-US" dirty="0"/>
+              <a:t>Interview Scenario – Isabelle Grenier</a:t>
+            </a:r>
+          </a:p>
+        </p:txBody>
+      </p:sp>
+      <p:sp>
+        <p:nvSpPr>
+          <p:cNvPr id="7" name="Slide Number Placeholder 6">
+            <a:extLst>
+              <a:ext uri="{FF2B5EF4-FFF2-40B4-BE49-F238E27FC236}">
+                <a16:creationId xmlns:a16="http://schemas.microsoft.com/office/drawing/2014/main" id="{3D284645-74A9-4209-1803-3824A561E2CB}"/>
+              </a:ext>
+            </a:extLst>
+          </p:cNvPr>
+          <p:cNvSpPr>
+            <a:spLocks noGrp="1"/>
+          </p:cNvSpPr>
+          <p:nvPr>
+            <p:ph type="sldNum" sz="quarter" idx="12"/>
+          </p:nvPr>
+        </p:nvSpPr>
+        <p:spPr/>
+        <p:txBody>
+          <a:bodyPr/>
+          <a:lstStyle/>
+          <a:p>
+            <a:fld id="{B9713C8C-8E70-45D5-AE59-23E60168254E}" type="slidenum">
+              <a:rPr lang="en-US" smtClean="0"/>
+              <a:t>22</a:t>
+            </a:fld>
+            <a:endParaRPr lang="en-US" dirty="0"/>
+          </a:p>
+        </p:txBody>
+      </p:sp>
+      <p:pic>
+        <p:nvPicPr>
+          <p:cNvPr id="9" name="Picture 8" descr="Chart&#10;&#10;Description automatically generated">
+            <a:extLst>
+              <a:ext uri="{FF2B5EF4-FFF2-40B4-BE49-F238E27FC236}">
+                <a16:creationId xmlns:a16="http://schemas.microsoft.com/office/drawing/2014/main" id="{E7151482-B92D-5154-BF1E-440C34AF8444}"/>
+              </a:ext>
+            </a:extLst>
+          </p:cNvPr>
+          <p:cNvPicPr>
+            <a:picLocks noChangeAspect="1"/>
+          </p:cNvPicPr>
+          <p:nvPr/>
+        </p:nvPicPr>
+        <p:blipFill>
+          <a:blip r:embed="rId2"/>
+          <a:stretch>
+            <a:fillRect/>
+          </a:stretch>
+        </p:blipFill>
+        <p:spPr>
+          <a:xfrm>
+            <a:off x="6209490" y="1690688"/>
+            <a:ext cx="4983811" cy="4153176"/>
           </a:xfrm>
           <a:prstGeom prst="rect">
             <a:avLst/>
@@ -37620,7 +37902,7 @@
 </p:sld>
 </file>
 
-<file path=ppt/slides/slide22.xml><?xml version="1.0" encoding="utf-8"?>
+<file path=ppt/slides/slide23.xml><?xml version="1.0" encoding="utf-8"?>
 <p:sld xmlns:a="http://schemas.openxmlformats.org/drawingml/2006/main" xmlns:r="http://schemas.openxmlformats.org/officeDocument/2006/relationships" xmlns:p="http://schemas.openxmlformats.org/presentationml/2006/main">
   <p:cSld>
     <p:spTree>
@@ -37840,7 +38122,7 @@
                   <a:spcPts val="600"/>
                 </a:spcAft>
               </a:pPr>
-              <a:t>22</a:t>
+              <a:t>23</a:t>
             </a:fld>
             <a:endParaRPr lang="en-US"/>
           </a:p>
@@ -37859,7 +38141,7 @@
 </p:sld>
 </file>
 
-<file path=ppt/slides/slide23.xml><?xml version="1.0" encoding="utf-8"?>
+<file path=ppt/slides/slide24.xml><?xml version="1.0" encoding="utf-8"?>
 <p:sld xmlns:a="http://schemas.openxmlformats.org/drawingml/2006/main" xmlns:r="http://schemas.openxmlformats.org/officeDocument/2006/relationships" xmlns:p="http://schemas.openxmlformats.org/presentationml/2006/main">
   <p:cSld>
     <p:spTree>
@@ -38014,7 +38296,7 @@
 </p:sld>
 </file>
 
-<file path=ppt/slides/slide24.xml><?xml version="1.0" encoding="utf-8"?>
+<file path=ppt/slides/slide25.xml><?xml version="1.0" encoding="utf-8"?>
 <p:sld xmlns:a="http://schemas.openxmlformats.org/drawingml/2006/main" xmlns:r="http://schemas.openxmlformats.org/officeDocument/2006/relationships" xmlns:p="http://schemas.openxmlformats.org/presentationml/2006/main" show="0">
   <p:cSld>
     <p:spTree>
@@ -38205,7 +38487,7 @@
           <a:p>
             <a:fld id="{B9713C8C-8E70-45D5-AE59-23E60168254E}" type="slidenum">
               <a:rPr lang="en-US" smtClean="0"/>
-              <a:t>24</a:t>
+              <a:t>25</a:t>
             </a:fld>
             <a:endParaRPr lang="en-US" dirty="0"/>
           </a:p>
@@ -41324,21 +41606,21 @@
 </file>
 
 <file path=customXml/item1.xml><?xml version="1.0" encoding="utf-8"?>
+<?mso-contentType ?>
+<FormTemplates xmlns="http://schemas.microsoft.com/sharepoint/v3/contenttype/forms">
+  <Display>DocumentLibraryForm</Display>
+  <Edit>DocumentLibraryForm</Edit>
+  <New>DocumentLibraryForm</New>
+</FormTemplates>
+</file>
+
+<file path=customXml/item2.xml><?xml version="1.0" encoding="utf-8"?>
 <p:properties xmlns:p="http://schemas.microsoft.com/office/2006/metadata/properties" xmlns:xsi="http://www.w3.org/2001/XMLSchema-instance" xmlns:pc="http://schemas.microsoft.com/office/infopath/2007/PartnerControls">
   <documentManagement>
     <Status xmlns="71af3243-3dd4-4a8d-8c0d-dd76da1f02a5">Not started</Status>
     <MediaServiceKeyPoints xmlns="71af3243-3dd4-4a8d-8c0d-dd76da1f02a5" xsi:nil="true"/>
   </documentManagement>
 </p:properties>
-</file>
-
-<file path=customXml/item2.xml><?xml version="1.0" encoding="utf-8"?>
-<?mso-contentType ?>
-<FormTemplates xmlns="http://schemas.microsoft.com/sharepoint/v3/contenttype/forms">
-  <Display>DocumentLibraryForm</Display>
-  <Edit>DocumentLibraryForm</Edit>
-  <New>DocumentLibraryForm</New>
-</FormTemplates>
 </file>
 
 <file path=customXml/item3.xml><?xml version="1.0" encoding="utf-8"?>
@@ -41563,19 +41845,19 @@
 </file>
 
 <file path=customXml/itemProps1.xml><?xml version="1.0" encoding="utf-8"?>
+<ds:datastoreItem xmlns:ds="http://schemas.openxmlformats.org/officeDocument/2006/customXml" ds:itemID="{C0DCE9DA-F7FD-45FA-83B7-D9813A44258A}">
+  <ds:schemaRefs>
+    <ds:schemaRef ds:uri="http://schemas.microsoft.com/sharepoint/v3/contenttype/forms"/>
+  </ds:schemaRefs>
+</ds:datastoreItem>
+</file>
+
+<file path=customXml/itemProps2.xml><?xml version="1.0" encoding="utf-8"?>
 <ds:datastoreItem xmlns:ds="http://schemas.openxmlformats.org/officeDocument/2006/customXml" ds:itemID="{9DFCC198-DBFA-46B2-A241-8E3888E63670}">
   <ds:schemaRefs>
     <ds:schemaRef ds:uri="http://schemas.microsoft.com/office/2006/metadata/properties"/>
     <ds:schemaRef ds:uri="http://schemas.microsoft.com/office/infopath/2007/PartnerControls"/>
     <ds:schemaRef ds:uri="71af3243-3dd4-4a8d-8c0d-dd76da1f02a5"/>
-  </ds:schemaRefs>
-</ds:datastoreItem>
-</file>
-
-<file path=customXml/itemProps2.xml><?xml version="1.0" encoding="utf-8"?>
-<ds:datastoreItem xmlns:ds="http://schemas.openxmlformats.org/officeDocument/2006/customXml" ds:itemID="{C0DCE9DA-F7FD-45FA-83B7-D9813A44258A}">
-  <ds:schemaRefs>
-    <ds:schemaRef ds:uri="http://schemas.microsoft.com/sharepoint/v3/contenttype/forms"/>
   </ds:schemaRefs>
 </ds:datastoreItem>
 </file>

</xml_diff>

<commit_message>
legend and figure clean up
</commit_message>
<xml_diff>
--- a/presentation_05032023.pptx
+++ b/presentation_05032023.pptx
@@ -33561,7 +33561,7 @@
           <p:nvPr>
             <p:extLst>
               <p:ext uri="{D42A27DB-BD31-4B8C-83A1-F6EECF244321}">
-                <p14:modId xmlns:p14="http://schemas.microsoft.com/office/powerpoint/2010/main" val="2739651770"/>
+                <p14:modId xmlns:p14="http://schemas.microsoft.com/office/powerpoint/2010/main" val="1457431852"/>
               </p:ext>
             </p:extLst>
           </p:nvPr>
@@ -33771,7 +33771,15 @@
                       </a:pPr>
                       <a:r>
                         <a:rPr lang="en-US" i="1" dirty="0"/>
-                        <a:t>We group at the stage level to have events in all groups.</a:t>
+                        <a:t>We </a:t>
+                      </a:r>
+                      <a:r>
+                        <a:rPr lang="en-US" b="1" i="1" dirty="0"/>
+                        <a:t>group</a:t>
+                      </a:r>
+                      <a:r>
+                        <a:rPr lang="en-US" i="1" dirty="0"/>
+                        <a:t> at the stage level to have events in all groups.</a:t>
                       </a:r>
                       <a:endParaRPr lang="en-US" b="1" i="1" dirty="0"/>
                     </a:p>
@@ -35199,13 +35207,13 @@
           <p:nvPr>
             <p:extLst>
               <p:ext uri="{D42A27DB-BD31-4B8C-83A1-F6EECF244321}">
-                <p14:modId xmlns:p14="http://schemas.microsoft.com/office/powerpoint/2010/main" val="1058557904"/>
+                <p14:modId xmlns:p14="http://schemas.microsoft.com/office/powerpoint/2010/main" val="3636056937"/>
               </p:ext>
             </p:extLst>
           </p:nvPr>
         </p:nvGraphicFramePr>
         <p:xfrm>
-          <a:off x="1401618" y="3555048"/>
+          <a:off x="958824" y="3710034"/>
           <a:ext cx="4359564" cy="1569820"/>
         </p:xfrm>
         <a:graphic>
@@ -35508,7 +35516,7 @@
         </p:blipFill>
         <p:spPr>
           <a:xfrm>
-            <a:off x="6324600" y="1690688"/>
+            <a:off x="5595023" y="1690688"/>
             <a:ext cx="4937761" cy="4114801"/>
           </a:xfrm>
           <a:prstGeom prst="rect">
@@ -35530,7 +35538,7 @@
         </p:nvGrpSpPr>
         <p:grpSpPr>
           <a:xfrm>
-            <a:off x="10243226" y="4943052"/>
+            <a:off x="9416372" y="4943052"/>
             <a:ext cx="2184779" cy="605792"/>
             <a:chOff x="7227651" y="575333"/>
             <a:chExt cx="2148410" cy="605792"/>
@@ -35715,6 +35723,167 @@
           </p:txBody>
         </p:sp>
       </p:grpSp>
+      <p:cxnSp>
+        <p:nvCxnSpPr>
+          <p:cNvPr id="11" name="Straight Arrow Connector 10">
+            <a:extLst>
+              <a:ext uri="{FF2B5EF4-FFF2-40B4-BE49-F238E27FC236}">
+                <a16:creationId xmlns:a16="http://schemas.microsoft.com/office/drawing/2014/main" id="{D782645B-E3C9-2832-125D-D2264DA1FBF8}"/>
+              </a:ext>
+            </a:extLst>
+          </p:cNvPr>
+          <p:cNvCxnSpPr>
+            <a:cxnSpLocks/>
+          </p:cNvCxnSpPr>
+          <p:nvPr/>
+        </p:nvCxnSpPr>
+        <p:spPr>
+          <a:xfrm flipV="1">
+            <a:off x="10717699" y="3246307"/>
+            <a:ext cx="0" cy="501781"/>
+          </a:xfrm>
+          <a:prstGeom prst="straightConnector1">
+            <a:avLst/>
+          </a:prstGeom>
+          <a:ln w="76200">
+            <a:solidFill>
+              <a:srgbClr val="FF0000"/>
+            </a:solidFill>
+            <a:tailEnd type="triangle"/>
+          </a:ln>
+        </p:spPr>
+        <p:style>
+          <a:lnRef idx="1">
+            <a:schemeClr val="accent1"/>
+          </a:lnRef>
+          <a:fillRef idx="0">
+            <a:schemeClr val="accent1"/>
+          </a:fillRef>
+          <a:effectRef idx="0">
+            <a:schemeClr val="accent1"/>
+          </a:effectRef>
+          <a:fontRef idx="minor">
+            <a:schemeClr val="tx1"/>
+          </a:fontRef>
+        </p:style>
+      </p:cxnSp>
+      <p:cxnSp>
+        <p:nvCxnSpPr>
+          <p:cNvPr id="21" name="Straight Connector 20">
+            <a:extLst>
+              <a:ext uri="{FF2B5EF4-FFF2-40B4-BE49-F238E27FC236}">
+                <a16:creationId xmlns:a16="http://schemas.microsoft.com/office/drawing/2014/main" id="{67C86B39-E337-8861-FED3-8B30B3FFFB13}"/>
+              </a:ext>
+            </a:extLst>
+          </p:cNvPr>
+          <p:cNvCxnSpPr>
+            <a:cxnSpLocks/>
+          </p:cNvCxnSpPr>
+          <p:nvPr/>
+        </p:nvCxnSpPr>
+        <p:spPr>
+          <a:xfrm>
+            <a:off x="6154363" y="3835640"/>
+            <a:ext cx="4349236" cy="0"/>
+          </a:xfrm>
+          <a:prstGeom prst="line">
+            <a:avLst/>
+          </a:prstGeom>
+          <a:ln w="38100"/>
+        </p:spPr>
+        <p:style>
+          <a:lnRef idx="1">
+            <a:schemeClr val="accent1"/>
+          </a:lnRef>
+          <a:fillRef idx="0">
+            <a:schemeClr val="accent1"/>
+          </a:fillRef>
+          <a:effectRef idx="0">
+            <a:schemeClr val="accent1"/>
+          </a:effectRef>
+          <a:fontRef idx="minor">
+            <a:schemeClr val="tx1"/>
+          </a:fontRef>
+        </p:style>
+      </p:cxnSp>
+      <p:cxnSp>
+        <p:nvCxnSpPr>
+          <p:cNvPr id="23" name="Straight Connector 22">
+            <a:extLst>
+              <a:ext uri="{FF2B5EF4-FFF2-40B4-BE49-F238E27FC236}">
+                <a16:creationId xmlns:a16="http://schemas.microsoft.com/office/drawing/2014/main" id="{AEDC5117-594E-F343-043E-30190737AA86}"/>
+              </a:ext>
+            </a:extLst>
+          </p:cNvPr>
+          <p:cNvCxnSpPr>
+            <a:cxnSpLocks/>
+          </p:cNvCxnSpPr>
+          <p:nvPr/>
+        </p:nvCxnSpPr>
+        <p:spPr>
+          <a:xfrm>
+            <a:off x="6154363" y="3167379"/>
+            <a:ext cx="4349236" cy="0"/>
+          </a:xfrm>
+          <a:prstGeom prst="line">
+            <a:avLst/>
+          </a:prstGeom>
+          <a:ln w="38100"/>
+        </p:spPr>
+        <p:style>
+          <a:lnRef idx="1">
+            <a:schemeClr val="accent1"/>
+          </a:lnRef>
+          <a:fillRef idx="0">
+            <a:schemeClr val="accent1"/>
+          </a:fillRef>
+          <a:effectRef idx="0">
+            <a:schemeClr val="accent1"/>
+          </a:effectRef>
+          <a:fontRef idx="minor">
+            <a:schemeClr val="tx1"/>
+          </a:fontRef>
+        </p:style>
+      </p:cxnSp>
+      <p:sp>
+        <p:nvSpPr>
+          <p:cNvPr id="25" name="TextBox 24">
+            <a:extLst>
+              <a:ext uri="{FF2B5EF4-FFF2-40B4-BE49-F238E27FC236}">
+                <a16:creationId xmlns:a16="http://schemas.microsoft.com/office/drawing/2014/main" id="{A2050386-564C-C8E7-CDDB-297A732DA768}"/>
+              </a:ext>
+            </a:extLst>
+          </p:cNvPr>
+          <p:cNvSpPr txBox="1"/>
+          <p:nvPr/>
+        </p:nvSpPr>
+        <p:spPr>
+          <a:xfrm>
+            <a:off x="10902615" y="3035532"/>
+            <a:ext cx="1382581" cy="923330"/>
+          </a:xfrm>
+          <a:prstGeom prst="rect">
+            <a:avLst/>
+          </a:prstGeom>
+          <a:noFill/>
+        </p:spPr>
+        <p:txBody>
+          <a:bodyPr wrap="square" rtlCol="0">
+            <a:spAutoFit/>
+          </a:bodyPr>
+          <a:lstStyle/>
+          <a:p>
+            <a:r>
+              <a:rPr lang="en-US" i="1" dirty="0">
+                <a:solidFill>
+                  <a:srgbClr val="FF0000"/>
+                </a:solidFill>
+              </a:rPr>
+              <a:t>We could increase the threshold</a:t>
+            </a:r>
+          </a:p>
+        </p:txBody>
+      </p:sp>
     </p:spTree>
     <p:extLst>
       <p:ext uri="{BB962C8B-B14F-4D97-AF65-F5344CB8AC3E}">
@@ -40126,7 +40295,7 @@
           <p:nvPr>
             <p:extLst>
               <p:ext uri="{D42A27DB-BD31-4B8C-83A1-F6EECF244321}">
-                <p14:modId xmlns:p14="http://schemas.microsoft.com/office/powerpoint/2010/main" val="2349306837"/>
+                <p14:modId xmlns:p14="http://schemas.microsoft.com/office/powerpoint/2010/main" val="984317238"/>
               </p:ext>
             </p:extLst>
           </p:nvPr>
@@ -40279,7 +40448,7 @@
                       </a:pPr>
                       <a:r>
                         <a:rPr lang="en-US" i="1" dirty="0"/>
-                        <a:t>Yes</a:t>
+                        <a:t>No</a:t>
                       </a:r>
                     </a:p>
                   </a:txBody>
@@ -40543,7 +40712,7 @@
           <p:nvPr>
             <p:extLst>
               <p:ext uri="{D42A27DB-BD31-4B8C-83A1-F6EECF244321}">
-                <p14:modId xmlns:p14="http://schemas.microsoft.com/office/powerpoint/2010/main" val="1937635674"/>
+                <p14:modId xmlns:p14="http://schemas.microsoft.com/office/powerpoint/2010/main" val="2476271821"/>
               </p:ext>
             </p:extLst>
           </p:nvPr>
@@ -40696,7 +40865,7 @@
                       </a:pPr>
                       <a:r>
                         <a:rPr lang="en-US" i="1" dirty="0"/>
-                        <a:t>Yes</a:t>
+                        <a:t>No</a:t>
                       </a:r>
                     </a:p>
                   </a:txBody>
@@ -40948,14 +41117,14 @@
           <p:nvPr>
             <p:extLst>
               <p:ext uri="{D42A27DB-BD31-4B8C-83A1-F6EECF244321}">
-                <p14:modId xmlns:p14="http://schemas.microsoft.com/office/powerpoint/2010/main" val="1771348873"/>
+                <p14:modId xmlns:p14="http://schemas.microsoft.com/office/powerpoint/2010/main" val="3838647170"/>
               </p:ext>
             </p:extLst>
           </p:nvPr>
         </p:nvGraphicFramePr>
         <p:xfrm>
           <a:off x="833576" y="2007020"/>
-          <a:ext cx="5793041" cy="2392680"/>
+          <a:ext cx="5793041" cy="2667000"/>
         </p:xfrm>
         <a:graphic>
           <a:graphicData uri="http://schemas.openxmlformats.org/drawingml/2006/table">
@@ -41155,7 +41324,19 @@
                       </a:pPr>
                       <a:r>
                         <a:rPr lang="en-US" i="1" dirty="0"/>
-                        <a:t>No events in the subjects who reported being Hispanic or Latino</a:t>
+                        <a:t>No “events” in the subjects who reported being Hispanic or Latino so we </a:t>
+                      </a:r>
+                      <a:r>
+                        <a:rPr lang="en-US" b="1" i="1" dirty="0">
+                          <a:solidFill>
+                            <a:srgbClr val="FF0000"/>
+                          </a:solidFill>
+                        </a:rPr>
+                        <a:t>drop</a:t>
+                      </a:r>
+                      <a:r>
+                        <a:rPr lang="en-US" i="1" dirty="0"/>
+                        <a:t> the variable from the analysis</a:t>
                       </a:r>
                     </a:p>
                   </a:txBody>
@@ -41360,7 +41541,7 @@
           <p:nvPr>
             <p:extLst>
               <p:ext uri="{D42A27DB-BD31-4B8C-83A1-F6EECF244321}">
-                <p14:modId xmlns:p14="http://schemas.microsoft.com/office/powerpoint/2010/main" val="2511025677"/>
+                <p14:modId xmlns:p14="http://schemas.microsoft.com/office/powerpoint/2010/main" val="2719532299"/>
               </p:ext>
             </p:extLst>
           </p:nvPr>
@@ -41550,7 +41731,19 @@
                       </a:pPr>
                       <a:r>
                         <a:rPr lang="en-US" i="1" dirty="0"/>
-                        <a:t>Some race categories contained too few cases and too few events, so we group them in a single category called “other”</a:t>
+                        <a:t>Some race categories contained too few cases and too few events, so we </a:t>
+                      </a:r>
+                      <a:r>
+                        <a:rPr lang="en-US" b="1" i="1" dirty="0"/>
+                        <a:t>group </a:t>
+                      </a:r>
+                      <a:r>
+                        <a:rPr lang="en-US" b="0" i="1" dirty="0"/>
+                        <a:t>them</a:t>
+                      </a:r>
+                      <a:r>
+                        <a:rPr lang="en-US" i="1" dirty="0"/>
+                        <a:t> in a single category called “other”</a:t>
                       </a:r>
                     </a:p>
                   </a:txBody>
@@ -42619,21 +42812,21 @@
 </file>
 
 <file path=customXml/item1.xml><?xml version="1.0" encoding="utf-8"?>
+<p:properties xmlns:p="http://schemas.microsoft.com/office/2006/metadata/properties" xmlns:xsi="http://www.w3.org/2001/XMLSchema-instance" xmlns:pc="http://schemas.microsoft.com/office/infopath/2007/PartnerControls">
+  <documentManagement>
+    <Status xmlns="71af3243-3dd4-4a8d-8c0d-dd76da1f02a5">Not started</Status>
+    <MediaServiceKeyPoints xmlns="71af3243-3dd4-4a8d-8c0d-dd76da1f02a5" xsi:nil="true"/>
+  </documentManagement>
+</p:properties>
+</file>
+
+<file path=customXml/item2.xml><?xml version="1.0" encoding="utf-8"?>
 <?mso-contentType ?>
 <FormTemplates xmlns="http://schemas.microsoft.com/sharepoint/v3/contenttype/forms">
   <Display>DocumentLibraryForm</Display>
   <Edit>DocumentLibraryForm</Edit>
   <New>DocumentLibraryForm</New>
 </FormTemplates>
-</file>
-
-<file path=customXml/item2.xml><?xml version="1.0" encoding="utf-8"?>
-<p:properties xmlns:p="http://schemas.microsoft.com/office/2006/metadata/properties" xmlns:xsi="http://www.w3.org/2001/XMLSchema-instance" xmlns:pc="http://schemas.microsoft.com/office/infopath/2007/PartnerControls">
-  <documentManagement>
-    <Status xmlns="71af3243-3dd4-4a8d-8c0d-dd76da1f02a5">Not started</Status>
-    <MediaServiceKeyPoints xmlns="71af3243-3dd4-4a8d-8c0d-dd76da1f02a5" xsi:nil="true"/>
-  </documentManagement>
-</p:properties>
 </file>
 
 <file path=customXml/item3.xml><?xml version="1.0" encoding="utf-8"?>
@@ -42858,19 +43051,19 @@
 </file>
 
 <file path=customXml/itemProps1.xml><?xml version="1.0" encoding="utf-8"?>
-<ds:datastoreItem xmlns:ds="http://schemas.openxmlformats.org/officeDocument/2006/customXml" ds:itemID="{C0DCE9DA-F7FD-45FA-83B7-D9813A44258A}">
+<ds:datastoreItem xmlns:ds="http://schemas.openxmlformats.org/officeDocument/2006/customXml" ds:itemID="{9DFCC198-DBFA-46B2-A241-8E3888E63670}">
   <ds:schemaRefs>
-    <ds:schemaRef ds:uri="http://schemas.microsoft.com/sharepoint/v3/contenttype/forms"/>
+    <ds:schemaRef ds:uri="http://schemas.microsoft.com/office/2006/metadata/properties"/>
+    <ds:schemaRef ds:uri="http://schemas.microsoft.com/office/infopath/2007/PartnerControls"/>
+    <ds:schemaRef ds:uri="71af3243-3dd4-4a8d-8c0d-dd76da1f02a5"/>
   </ds:schemaRefs>
 </ds:datastoreItem>
 </file>
 
 <file path=customXml/itemProps2.xml><?xml version="1.0" encoding="utf-8"?>
-<ds:datastoreItem xmlns:ds="http://schemas.openxmlformats.org/officeDocument/2006/customXml" ds:itemID="{9DFCC198-DBFA-46B2-A241-8E3888E63670}">
+<ds:datastoreItem xmlns:ds="http://schemas.openxmlformats.org/officeDocument/2006/customXml" ds:itemID="{C0DCE9DA-F7FD-45FA-83B7-D9813A44258A}">
   <ds:schemaRefs>
-    <ds:schemaRef ds:uri="http://schemas.microsoft.com/office/2006/metadata/properties"/>
-    <ds:schemaRef ds:uri="http://schemas.microsoft.com/office/infopath/2007/PartnerControls"/>
-    <ds:schemaRef ds:uri="71af3243-3dd4-4a8d-8c0d-dd76da1f02a5"/>
+    <ds:schemaRef ds:uri="http://schemas.microsoft.com/sharepoint/v3/contenttype/forms"/>
   </ds:schemaRefs>
 </ds:datastoreItem>
 </file>

</xml_diff>

<commit_message>
switch to figures with labels for correlation
</commit_message>
<xml_diff>
--- a/presentation_05032023.pptx
+++ b/presentation_05032023.pptx
@@ -36277,6 +36277,43 @@
           </a:prstGeom>
         </p:spPr>
       </p:pic>
+      <p:sp>
+        <p:nvSpPr>
+          <p:cNvPr id="7" name="TextBox 6">
+            <a:extLst>
+              <a:ext uri="{FF2B5EF4-FFF2-40B4-BE49-F238E27FC236}">
+                <a16:creationId xmlns:a16="http://schemas.microsoft.com/office/drawing/2014/main" id="{AD5D3E26-01D8-36F9-E0AD-315920397EBC}"/>
+              </a:ext>
+            </a:extLst>
+          </p:cNvPr>
+          <p:cNvSpPr txBox="1"/>
+          <p:nvPr/>
+        </p:nvSpPr>
+        <p:spPr>
+          <a:xfrm>
+            <a:off x="5379391" y="4893013"/>
+            <a:ext cx="2110902" cy="369332"/>
+          </a:xfrm>
+          <a:prstGeom prst="rect">
+            <a:avLst/>
+          </a:prstGeom>
+          <a:solidFill>
+            <a:schemeClr val="bg1"/>
+          </a:solidFill>
+        </p:spPr>
+        <p:txBody>
+          <a:bodyPr wrap="square" rtlCol="0">
+            <a:spAutoFit/>
+          </a:bodyPr>
+          <a:lstStyle/>
+          <a:p>
+            <a:r>
+              <a:rPr lang="en-US" dirty="0"/>
+              <a:t>Age at Diagnosis</a:t>
+            </a:r>
+          </a:p>
+        </p:txBody>
+      </p:sp>
     </p:spTree>
     <p:extLst>
       <p:ext uri="{BB962C8B-B14F-4D97-AF65-F5344CB8AC3E}">
@@ -37526,10 +37563,10 @@
       </p:sp>
       <p:pic>
         <p:nvPicPr>
-          <p:cNvPr id="9" name="Picture 8" descr="Chart, box and whisker chart&#10;&#10;Description automatically generated">
+          <p:cNvPr id="13" name="Picture 12" descr="Chart, histogram&#10;&#10;Description automatically generated">
             <a:extLst>
               <a:ext uri="{FF2B5EF4-FFF2-40B4-BE49-F238E27FC236}">
-                <a16:creationId xmlns:a16="http://schemas.microsoft.com/office/drawing/2014/main" id="{094F2DA3-30A4-4F19-C8AC-94928683E1BF}"/>
+                <a16:creationId xmlns:a16="http://schemas.microsoft.com/office/drawing/2014/main" id="{7B482501-4CDE-5581-B806-9BDE37F19D2A}"/>
               </a:ext>
             </a:extLst>
           </p:cNvPr>
@@ -37546,8 +37583,8 @@
         </p:blipFill>
         <p:spPr>
           <a:xfrm>
-            <a:off x="8153400" y="3092650"/>
-            <a:ext cx="3655500" cy="3046250"/>
+            <a:off x="445932" y="3092650"/>
+            <a:ext cx="3916440" cy="3263700"/>
           </a:xfrm>
           <a:prstGeom prst="rect">
             <a:avLst/>
@@ -37556,10 +37593,10 @@
       </p:pic>
       <p:pic>
         <p:nvPicPr>
-          <p:cNvPr id="11" name="Picture 10" descr="Chart, box and whisker chart&#10;&#10;Description automatically generated">
+          <p:cNvPr id="8" name="Picture 7" descr="Chart, box and whisker chart&#10;&#10;Description automatically generated">
             <a:extLst>
               <a:ext uri="{FF2B5EF4-FFF2-40B4-BE49-F238E27FC236}">
-                <a16:creationId xmlns:a16="http://schemas.microsoft.com/office/drawing/2014/main" id="{5E0D1C34-B91C-9737-116F-5A1D187B8A4A}"/>
+                <a16:creationId xmlns:a16="http://schemas.microsoft.com/office/drawing/2014/main" id="{4F525474-52FB-058F-55D4-8297BEECACA5}"/>
               </a:ext>
             </a:extLst>
           </p:cNvPr>
@@ -37576,8 +37613,8 @@
         </p:blipFill>
         <p:spPr>
           <a:xfrm>
-            <a:off x="4362371" y="3092651"/>
-            <a:ext cx="3655500" cy="3046250"/>
+            <a:off x="8153399" y="3092650"/>
+            <a:ext cx="3698135" cy="3081779"/>
           </a:xfrm>
           <a:prstGeom prst="rect">
             <a:avLst/>
@@ -37586,10 +37623,10 @@
       </p:pic>
       <p:pic>
         <p:nvPicPr>
-          <p:cNvPr id="13" name="Picture 12" descr="Chart, histogram&#10;&#10;Description automatically generated">
+          <p:cNvPr id="12" name="Picture 11" descr="Chart, box and whisker chart&#10;&#10;Description automatically generated">
             <a:extLst>
               <a:ext uri="{FF2B5EF4-FFF2-40B4-BE49-F238E27FC236}">
-                <a16:creationId xmlns:a16="http://schemas.microsoft.com/office/drawing/2014/main" id="{7B482501-4CDE-5581-B806-9BDE37F19D2A}"/>
+                <a16:creationId xmlns:a16="http://schemas.microsoft.com/office/drawing/2014/main" id="{330CD3A4-8562-DCD8-8DA1-7A7C658E7A54}"/>
               </a:ext>
             </a:extLst>
           </p:cNvPr>
@@ -37606,8 +37643,8 @@
         </p:blipFill>
         <p:spPr>
           <a:xfrm>
-            <a:off x="445932" y="3092650"/>
-            <a:ext cx="3916440" cy="3263700"/>
+            <a:off x="4408817" y="3092650"/>
+            <a:ext cx="3698136" cy="3081780"/>
           </a:xfrm>
           <a:prstGeom prst="rect">
             <a:avLst/>
@@ -37700,7 +37737,7 @@
           <a:p>
             <a:r>
               <a:rPr lang="en-US" dirty="0"/>
-              <a:t>We compute the correlation between each available gene and the survival time</a:t>
+              <a:t>We compute the correlation between each available gene and the survival time (log scale)</a:t>
             </a:r>
           </a:p>
         </p:txBody>

</xml_diff>